<commit_message>
updated Comprehend deck for WL vidoe submission
</commit_message>
<xml_diff>
--- a/public/Exam Notes/Comprehend Video Deck.pptx
+++ b/public/Exam Notes/Comprehend Video Deck.pptx
@@ -16,17 +16,16 @@
     <p:sldId id="261" r:id="rId11"/>
     <p:sldId id="262" r:id="rId12"/>
     <p:sldId id="263" r:id="rId13"/>
-    <p:sldId id="264" r:id="rId14"/>
   </p:sldIdLst>
   <p:sldSz cy="5143500" cx="9144000"/>
   <p:notesSz cx="6858000" cy="9144000"/>
   <p:embeddedFontLst>
     <p:embeddedFont>
       <p:font typeface="Open Sans"/>
-      <p:regular r:id="rId15"/>
-      <p:bold r:id="rId16"/>
-      <p:italic r:id="rId17"/>
-      <p:boldItalic r:id="rId18"/>
+      <p:regular r:id="rId14"/>
+      <p:bold r:id="rId15"/>
+      <p:italic r:id="rId16"/>
+      <p:boldItalic r:id="rId17"/>
     </p:embeddedFont>
   </p:embeddedFontLst>
   <p:defaultTextStyle>
@@ -807,7 +806,7 @@
   <p:cSld>
     <p:spTree>
       <p:nvGrpSpPr>
-        <p:cNvPr id="59" name="Shape 59"/>
+        <p:cNvPr id="64" name="Shape 64"/>
         <p:cNvGrpSpPr/>
         <p:nvPr/>
       </p:nvGrpSpPr>
@@ -821,7 +820,7 @@
       </p:grpSpPr>
       <p:sp>
         <p:nvSpPr>
-          <p:cNvPr id="60" name="Google Shape;60;g6b6ae8c65a_0_0:notes"/>
+          <p:cNvPr id="65" name="Google Shape;65;g6b6ae8c65a_0_0:notes"/>
           <p:cNvSpPr/>
           <p:nvPr>
             <p:ph idx="2" type="sldImg"/>
@@ -856,7 +855,7 @@
       </p:sp>
       <p:sp>
         <p:nvSpPr>
-          <p:cNvPr id="61" name="Google Shape;61;g6b6ae8c65a_0_0:notes"/>
+          <p:cNvPr id="66" name="Google Shape;66;g6b6ae8c65a_0_0:notes"/>
           <p:cNvSpPr txBox="1"/>
           <p:nvPr>
             <p:ph idx="1" type="body"/>
@@ -906,7 +905,7 @@
   <p:cSld>
     <p:spTree>
       <p:nvGrpSpPr>
-        <p:cNvPr id="70" name="Shape 70"/>
+        <p:cNvPr id="75" name="Shape 75"/>
         <p:cNvGrpSpPr/>
         <p:nvPr/>
       </p:nvGrpSpPr>
@@ -920,7 +919,7 @@
       </p:grpSpPr>
       <p:sp>
         <p:nvSpPr>
-          <p:cNvPr id="71" name="Google Shape;71;g6b6ae8c65a_0_8:notes"/>
+          <p:cNvPr id="76" name="Google Shape;76;g6b6ae8c65a_0_8:notes"/>
           <p:cNvSpPr/>
           <p:nvPr>
             <p:ph idx="2" type="sldImg"/>
@@ -955,7 +954,7 @@
       </p:sp>
       <p:sp>
         <p:nvSpPr>
-          <p:cNvPr id="72" name="Google Shape;72;g6b6ae8c65a_0_8:notes"/>
+          <p:cNvPr id="77" name="Google Shape;77;g6b6ae8c65a_0_8:notes"/>
           <p:cNvSpPr txBox="1"/>
           <p:nvPr>
             <p:ph idx="1" type="body"/>
@@ -1005,7 +1004,7 @@
   <p:cSld>
     <p:spTree>
       <p:nvGrpSpPr>
-        <p:cNvPr id="80" name="Shape 80"/>
+        <p:cNvPr id="87" name="Shape 87"/>
         <p:cNvGrpSpPr/>
         <p:nvPr/>
       </p:nvGrpSpPr>
@@ -1019,7 +1018,7 @@
       </p:grpSpPr>
       <p:sp>
         <p:nvSpPr>
-          <p:cNvPr id="81" name="Google Shape;81;g6b6ae8c65a_0_16:notes"/>
+          <p:cNvPr id="88" name="Google Shape;88;g6b6ae8c65a_0_16:notes"/>
           <p:cNvSpPr/>
           <p:nvPr>
             <p:ph idx="2" type="sldImg"/>
@@ -1054,7 +1053,7 @@
       </p:sp>
       <p:sp>
         <p:nvSpPr>
-          <p:cNvPr id="82" name="Google Shape;82;g6b6ae8c65a_0_16:notes"/>
+          <p:cNvPr id="89" name="Google Shape;89;g6b6ae8c65a_0_16:notes"/>
           <p:cNvSpPr txBox="1"/>
           <p:nvPr>
             <p:ph idx="1" type="body"/>
@@ -1104,7 +1103,7 @@
   <p:cSld>
     <p:spTree>
       <p:nvGrpSpPr>
-        <p:cNvPr id="91" name="Shape 91"/>
+        <p:cNvPr id="98" name="Shape 98"/>
         <p:cNvGrpSpPr/>
         <p:nvPr/>
       </p:nvGrpSpPr>
@@ -1118,7 +1117,7 @@
       </p:grpSpPr>
       <p:sp>
         <p:nvSpPr>
-          <p:cNvPr id="92" name="Google Shape;92;g7581c2bc5d_1_4:notes"/>
+          <p:cNvPr id="99" name="Google Shape;99;g7581c2bc5d_1_4:notes"/>
           <p:cNvSpPr/>
           <p:nvPr>
             <p:ph idx="2" type="sldImg"/>
@@ -1153,7 +1152,7 @@
       </p:sp>
       <p:sp>
         <p:nvSpPr>
-          <p:cNvPr id="93" name="Google Shape;93;g7581c2bc5d_1_4:notes"/>
+          <p:cNvPr id="100" name="Google Shape;100;g7581c2bc5d_1_4:notes"/>
           <p:cNvSpPr txBox="1"/>
           <p:nvPr>
             <p:ph idx="1" type="body"/>
@@ -1203,7 +1202,7 @@
   <p:cSld>
     <p:spTree>
       <p:nvGrpSpPr>
-        <p:cNvPr id="102" name="Shape 102"/>
+        <p:cNvPr id="109" name="Shape 109"/>
         <p:cNvGrpSpPr/>
         <p:nvPr/>
       </p:nvGrpSpPr>
@@ -1217,7 +1216,7 @@
       </p:grpSpPr>
       <p:sp>
         <p:nvSpPr>
-          <p:cNvPr id="103" name="Google Shape;103;g7581c2bc5d_1_11:notes"/>
+          <p:cNvPr id="110" name="Google Shape;110;g7581c2bc5d_1_11:notes"/>
           <p:cNvSpPr/>
           <p:nvPr>
             <p:ph idx="2" type="sldImg"/>
@@ -1252,7 +1251,7 @@
       </p:sp>
       <p:sp>
         <p:nvSpPr>
-          <p:cNvPr id="104" name="Google Shape;104;g7581c2bc5d_1_11:notes"/>
+          <p:cNvPr id="111" name="Google Shape;111;g7581c2bc5d_1_11:notes"/>
           <p:cNvSpPr txBox="1"/>
           <p:nvPr>
             <p:ph idx="1" type="body"/>
@@ -1302,7 +1301,7 @@
   <p:cSld>
     <p:spTree>
       <p:nvGrpSpPr>
-        <p:cNvPr id="113" name="Shape 113"/>
+        <p:cNvPr id="120" name="Shape 120"/>
         <p:cNvGrpSpPr/>
         <p:nvPr/>
       </p:nvGrpSpPr>
@@ -1316,7 +1315,7 @@
       </p:grpSpPr>
       <p:sp>
         <p:nvSpPr>
-          <p:cNvPr id="114" name="Google Shape;114;g7581c2bc5d_1_18:notes"/>
+          <p:cNvPr id="121" name="Google Shape;121;g7581c2bc5d_1_27:notes"/>
           <p:cNvSpPr/>
           <p:nvPr>
             <p:ph idx="2" type="sldImg"/>
@@ -1351,7 +1350,7 @@
       </p:sp>
       <p:sp>
         <p:nvSpPr>
-          <p:cNvPr id="115" name="Google Shape;115;g7581c2bc5d_1_18:notes"/>
+          <p:cNvPr id="122" name="Google Shape;122;g7581c2bc5d_1_27:notes"/>
           <p:cNvSpPr txBox="1"/>
           <p:nvPr>
             <p:ph idx="1" type="body"/>
@@ -1401,7 +1400,7 @@
   <p:cSld>
     <p:spTree>
       <p:nvGrpSpPr>
-        <p:cNvPr id="126" name="Shape 126"/>
+        <p:cNvPr id="132" name="Shape 132"/>
         <p:cNvGrpSpPr/>
         <p:nvPr/>
       </p:nvGrpSpPr>
@@ -1415,7 +1414,7 @@
       </p:grpSpPr>
       <p:sp>
         <p:nvSpPr>
-          <p:cNvPr id="127" name="Google Shape;127;g7581c2bc5d_1_42:notes"/>
+          <p:cNvPr id="133" name="Google Shape;133;g7581c2bc5d_1_42:notes"/>
           <p:cNvSpPr/>
           <p:nvPr>
             <p:ph idx="2" type="sldImg"/>
@@ -1450,106 +1449,7 @@
       </p:sp>
       <p:sp>
         <p:nvSpPr>
-          <p:cNvPr id="128" name="Google Shape;128;g7581c2bc5d_1_42:notes"/>
-          <p:cNvSpPr txBox="1"/>
-          <p:nvPr>
-            <p:ph idx="1" type="body"/>
-          </p:nvPr>
-        </p:nvSpPr>
-        <p:spPr>
-          <a:xfrm>
-            <a:off x="685800" y="4343400"/>
-            <a:ext cx="5486400" cy="4114800"/>
-          </a:xfrm>
-          <a:prstGeom prst="rect">
-            <a:avLst/>
-          </a:prstGeom>
-        </p:spPr>
-        <p:txBody>
-          <a:bodyPr anchorCtr="0" anchor="t" bIns="91425" lIns="91425" spcFirstLastPara="1" rIns="91425" wrap="square" tIns="91425">
-            <a:noAutofit/>
-          </a:bodyPr>
-          <a:lstStyle/>
-          <a:p>
-            <a:pPr indent="0" lvl="0" marL="0" rtl="0" algn="l">
-              <a:spcBef>
-                <a:spcPts val="0"/>
-              </a:spcBef>
-              <a:spcAft>
-                <a:spcPts val="0"/>
-              </a:spcAft>
-              <a:buNone/>
-            </a:pPr>
-            <a:r>
-              <a:t/>
-            </a:r>
-            <a:endParaRPr/>
-          </a:p>
-        </p:txBody>
-      </p:sp>
-    </p:spTree>
-  </p:cSld>
-  <p:clrMapOvr>
-    <a:masterClrMapping/>
-  </p:clrMapOvr>
-</p:notes>
-</file>
-
-<file path=ppt/notesSlides/notesSlide9.xml><?xml version="1.0" encoding="utf-8"?>
-<p:notes xmlns:a="http://schemas.openxmlformats.org/drawingml/2006/main" xmlns:r="http://schemas.openxmlformats.org/officeDocument/2006/relationships" xmlns:mc="http://schemas.openxmlformats.org/markup-compatibility/2006" xmlns:mv="urn:schemas-microsoft-com:mac:vml" xmlns:p="http://schemas.openxmlformats.org/presentationml/2006/main" xmlns:c="http://schemas.openxmlformats.org/drawingml/2006/chart" xmlns:dgm="http://schemas.openxmlformats.org/drawingml/2006/diagram" xmlns:o="urn:schemas-microsoft-com:office:office" xmlns:v="urn:schemas-microsoft-com:vml" xmlns:pvml="urn:schemas-microsoft-com:office:powerpoint" xmlns:com="http://schemas.openxmlformats.org/drawingml/2006/compatibility" xmlns:p14="http://schemas.microsoft.com/office/powerpoint/2010/main" xmlns:p15="http://schemas.microsoft.com/office/powerpoint/2012/main" showMasterPhAnim="0" showMasterSp="0">
-  <p:cSld>
-    <p:spTree>
-      <p:nvGrpSpPr>
-        <p:cNvPr id="145" name="Shape 145"/>
-        <p:cNvGrpSpPr/>
-        <p:nvPr/>
-      </p:nvGrpSpPr>
-      <p:grpSpPr>
-        <a:xfrm>
-          <a:off x="0" y="0"/>
-          <a:ext cx="0" cy="0"/>
-          <a:chOff x="0" y="0"/>
-          <a:chExt cx="0" cy="0"/>
-        </a:xfrm>
-      </p:grpSpPr>
-      <p:sp>
-        <p:nvSpPr>
-          <p:cNvPr id="146" name="Google Shape;146;g7581c2bc5d_1_27:notes"/>
-          <p:cNvSpPr/>
-          <p:nvPr>
-            <p:ph idx="2" type="sldImg"/>
-          </p:nvPr>
-        </p:nvSpPr>
-        <p:spPr>
-          <a:xfrm>
-            <a:off x="381300" y="685800"/>
-            <a:ext cx="6096000" cy="3429000"/>
-          </a:xfrm>
-          <a:custGeom>
-            <a:rect b="b" l="l" r="r" t="t"/>
-            <a:pathLst>
-              <a:path extrusionOk="0" h="120000" w="120000">
-                <a:moveTo>
-                  <a:pt x="0" y="0"/>
-                </a:moveTo>
-                <a:lnTo>
-                  <a:pt x="120000" y="0"/>
-                </a:lnTo>
-                <a:lnTo>
-                  <a:pt x="120000" y="120000"/>
-                </a:lnTo>
-                <a:lnTo>
-                  <a:pt x="0" y="120000"/>
-                </a:lnTo>
-                <a:close/>
-              </a:path>
-            </a:pathLst>
-          </a:custGeom>
-        </p:spPr>
-      </p:sp>
-      <p:sp>
-        <p:nvSpPr>
-          <p:cNvPr id="147" name="Google Shape;147;g7581c2bc5d_1_27:notes"/>
+          <p:cNvPr id="134" name="Google Shape;134;g7581c2bc5d_1_42:notes"/>
           <p:cNvSpPr txBox="1"/>
           <p:nvPr>
             <p:ph idx="1" type="body"/>
@@ -6346,8 +6246,8 @@
         </p:nvSpPr>
         <p:spPr>
           <a:xfrm>
-            <a:off x="228598" y="331691"/>
-            <a:ext cx="4572000" cy="468600"/>
+            <a:off x="228601" y="331700"/>
+            <a:ext cx="7059300" cy="468600"/>
           </a:xfrm>
           <a:prstGeom prst="rect">
             <a:avLst/>
@@ -6381,18 +6281,6 @@
               <a:buNone/>
             </a:pPr>
             <a:r>
-              <a:rPr b="1" i="0" lang="en" sz="2600" u="none" cap="none" strike="noStrike">
-                <a:solidFill>
-                  <a:srgbClr val="F2F2F2"/>
-                </a:solidFill>
-                <a:latin typeface="Open Sans"/>
-                <a:ea typeface="Open Sans"/>
-                <a:cs typeface="Open Sans"/>
-                <a:sym typeface="Open Sans"/>
-              </a:rPr>
-              <a:t>A</a:t>
-            </a:r>
-            <a:r>
               <a:rPr b="1" lang="en" sz="2600">
                 <a:solidFill>
                   <a:srgbClr val="F2F2F2"/>
@@ -6402,7 +6290,7 @@
                 <a:cs typeface="Open Sans"/>
                 <a:sym typeface="Open Sans"/>
               </a:rPr>
-              <a:t>mazon Comprehend</a:t>
+              <a:t>AWS Machine Learning Specialist Exam</a:t>
             </a:r>
             <a:endParaRPr sz="1100"/>
           </a:p>
@@ -6475,8 +6363,8 @@
         </p:nvSpPr>
         <p:spPr>
           <a:xfrm>
-            <a:off x="228601" y="952975"/>
-            <a:ext cx="2419500" cy="335100"/>
+            <a:off x="228599" y="952975"/>
+            <a:ext cx="3510600" cy="335100"/>
           </a:xfrm>
           <a:prstGeom prst="rect">
             <a:avLst/>
@@ -6510,6 +6398,18 @@
               <a:buNone/>
             </a:pPr>
             <a:r>
+              <a:rPr lang="en" sz="1700">
+                <a:solidFill>
+                  <a:srgbClr val="D9D9D9"/>
+                </a:solidFill>
+                <a:latin typeface="Open Sans"/>
+                <a:ea typeface="Open Sans"/>
+                <a:cs typeface="Open Sans"/>
+                <a:sym typeface="Open Sans"/>
+              </a:rPr>
+              <a:t>Comprehend</a:t>
+            </a:r>
+            <a:r>
               <a:rPr b="0" i="0" lang="en" sz="1700" u="none" cap="none" strike="noStrike">
                 <a:solidFill>
                   <a:srgbClr val="D9D9D9"/>
@@ -6519,7 +6419,7 @@
                 <a:cs typeface="Open Sans"/>
                 <a:sym typeface="Open Sans"/>
               </a:rPr>
-              <a:t>Exam Overview</a:t>
+              <a:t> Overview and Lab</a:t>
             </a:r>
             <a:endParaRPr sz="1100"/>
           </a:p>
@@ -6553,41 +6453,16 @@
           </a:ln>
         </p:spPr>
       </p:pic>
-    </p:spTree>
-  </p:cSld>
-  <p:clrMapOvr>
-    <a:masterClrMapping/>
-  </p:clrMapOvr>
-</p:sld>
-</file>
-
-<file path=ppt/slides/slide2.xml><?xml version="1.0" encoding="utf-8"?>
-<p:sld xmlns:a="http://schemas.openxmlformats.org/drawingml/2006/main" xmlns:r="http://schemas.openxmlformats.org/officeDocument/2006/relationships" xmlns:mc="http://schemas.openxmlformats.org/markup-compatibility/2006" xmlns:mv="urn:schemas-microsoft-com:mac:vml" xmlns:p="http://schemas.openxmlformats.org/presentationml/2006/main" xmlns:c="http://schemas.openxmlformats.org/drawingml/2006/chart" xmlns:dgm="http://schemas.openxmlformats.org/drawingml/2006/diagram" xmlns:o="urn:schemas-microsoft-com:office:office" xmlns:v="urn:schemas-microsoft-com:vml" xmlns:pvml="urn:schemas-microsoft-com:office:powerpoint" xmlns:com="http://schemas.openxmlformats.org/drawingml/2006/compatibility" xmlns:p14="http://schemas.microsoft.com/office/powerpoint/2010/main" xmlns:p15="http://schemas.microsoft.com/office/powerpoint/2012/main">
-  <p:cSld>
-    <p:spTree>
-      <p:nvGrpSpPr>
-        <p:cNvPr id="62" name="Shape 62"/>
-        <p:cNvGrpSpPr/>
-        <p:nvPr/>
-      </p:nvGrpSpPr>
-      <p:grpSpPr>
-        <a:xfrm>
-          <a:off x="0" y="0"/>
-          <a:ext cx="0" cy="0"/>
-          <a:chOff x="0" y="0"/>
-          <a:chExt cx="0" cy="0"/>
-        </a:xfrm>
-      </p:grpSpPr>
       <p:sp>
         <p:nvSpPr>
-          <p:cNvPr id="63" name="Google Shape;63;p14"/>
+          <p:cNvPr id="59" name="Google Shape;59;p13"/>
           <p:cNvSpPr txBox="1"/>
           <p:nvPr/>
         </p:nvSpPr>
         <p:spPr>
           <a:xfrm>
-            <a:off x="515475" y="3417800"/>
-            <a:ext cx="8292300" cy="1086900"/>
+            <a:off x="313775" y="2022275"/>
+            <a:ext cx="4395600" cy="373800"/>
           </a:xfrm>
           <a:prstGeom prst="rect">
             <a:avLst/>
@@ -6603,49 +6478,34 @@
           </a:bodyPr>
           <a:lstStyle/>
           <a:p>
-            <a:pPr indent="0" lvl="0" marL="0" rtl="0" algn="ctr">
-              <a:spcBef>
-                <a:spcPts val="0"/>
-              </a:spcBef>
-              <a:spcAft>
-                <a:spcPts val="0"/>
-              </a:spcAft>
-              <a:buNone/>
+            <a:pPr indent="-317500" lvl="0" marL="457200" rtl="0" algn="l">
+              <a:spcBef>
+                <a:spcPts val="0"/>
+              </a:spcBef>
+              <a:spcAft>
+                <a:spcPts val="0"/>
+              </a:spcAft>
+              <a:buSzPts val="1400"/>
+              <a:buChar char="❏"/>
             </a:pPr>
             <a:r>
-              <a:rPr lang="en" sz="3000">
-                <a:solidFill>
-                  <a:schemeClr val="dk2"/>
-                </a:solidFill>
-              </a:rPr>
-              <a:t>A machine learning driven service that allows you to discover insights and relationships in text</a:t>
+              <a:rPr lang="en"/>
+              <a:t>What is Comprehend?</a:t>
             </a:r>
-            <a:endParaRPr sz="3000">
-              <a:solidFill>
-                <a:schemeClr val="dk2"/>
-              </a:solidFill>
-            </a:endParaRPr>
+            <a:endParaRPr/>
           </a:p>
         </p:txBody>
       </p:sp>
-      <p:pic>
-        <p:nvPicPr>
-          <p:cNvPr id="64" name="Google Shape;64;p14"/>
-          <p:cNvPicPr preferRelativeResize="0"/>
+      <p:sp>
+        <p:nvSpPr>
+          <p:cNvPr id="60" name="Google Shape;60;p13"/>
+          <p:cNvSpPr txBox="1"/>
           <p:nvPr/>
-        </p:nvPicPr>
-        <p:blipFill>
-          <a:blip r:embed="rId3">
-            <a:alphaModFix/>
-          </a:blip>
-          <a:stretch>
-            <a:fillRect/>
-          </a:stretch>
-        </p:blipFill>
-        <p:spPr>
-          <a:xfrm>
-            <a:off x="3347175" y="1640500"/>
-            <a:ext cx="2628900" cy="1390650"/>
+        </p:nvSpPr>
+        <p:spPr>
+          <a:xfrm>
+            <a:off x="313775" y="2369619"/>
+            <a:ext cx="4395600" cy="373800"/>
           </a:xfrm>
           <a:prstGeom prst="rect">
             <a:avLst/>
@@ -6655,83 +6515,40 @@
             <a:noFill/>
           </a:ln>
         </p:spPr>
-      </p:pic>
-      <p:sp>
-        <p:nvSpPr>
-          <p:cNvPr id="65" name="Google Shape;65;p14"/>
-          <p:cNvSpPr/>
-          <p:nvPr/>
-        </p:nvSpPr>
-        <p:spPr>
-          <a:xfrm>
-            <a:off x="-179682" y="-308191"/>
-            <a:ext cx="9647400" cy="1688700"/>
-          </a:xfrm>
-          <a:prstGeom prst="rect">
-            <a:avLst/>
-          </a:prstGeom>
-          <a:solidFill>
-            <a:srgbClr val="002645"/>
-          </a:solidFill>
-          <a:ln>
-            <a:noFill/>
-          </a:ln>
-          <a:effectLst>
-            <a:outerShdw blurRad="50800" rotWithShape="0" dir="5400000" dist="38100">
-              <a:srgbClr val="000000">
-                <a:alpha val="40000"/>
-              </a:srgbClr>
-            </a:outerShdw>
-          </a:effectLst>
-        </p:spPr>
         <p:txBody>
-          <a:bodyPr anchorCtr="0" anchor="ctr" bIns="34275" lIns="34275" spcFirstLastPara="1" rIns="34275" wrap="square" tIns="34275">
+          <a:bodyPr anchorCtr="0" anchor="t" bIns="91425" lIns="91425" spcFirstLastPara="1" rIns="91425" wrap="square" tIns="91425">
             <a:noAutofit/>
           </a:bodyPr>
           <a:lstStyle/>
           <a:p>
-            <a:pPr indent="0" lvl="0" marL="0" marR="0" rtl="0" algn="ctr">
-              <a:lnSpc>
-                <a:spcPct val="100000"/>
-              </a:lnSpc>
-              <a:spcBef>
-                <a:spcPts val="0"/>
-              </a:spcBef>
-              <a:spcAft>
-                <a:spcPts val="0"/>
-              </a:spcAft>
-              <a:buClr>
-                <a:srgbClr val="FFFFFF"/>
-              </a:buClr>
+            <a:pPr indent="-317500" lvl="0" marL="457200" rtl="0" algn="l">
+              <a:spcBef>
+                <a:spcPts val="0"/>
+              </a:spcBef>
+              <a:spcAft>
+                <a:spcPts val="0"/>
+              </a:spcAft>
               <a:buSzPts val="1400"/>
-              <a:buFont typeface="Calibri"/>
-              <a:buNone/>
+              <a:buChar char="❏"/>
             </a:pPr>
             <a:r>
-              <a:t/>
+              <a:rPr lang="en"/>
+              <a:t>How Comprehend works</a:t>
             </a:r>
-            <a:endParaRPr b="0" i="0" sz="1400" u="none" cap="none" strike="noStrike">
-              <a:solidFill>
-                <a:srgbClr val="FFFFFF"/>
-              </a:solidFill>
-              <a:latin typeface="Calibri"/>
-              <a:ea typeface="Calibri"/>
-              <a:cs typeface="Calibri"/>
-              <a:sym typeface="Calibri"/>
-            </a:endParaRPr>
+            <a:endParaRPr/>
           </a:p>
         </p:txBody>
       </p:sp>
       <p:sp>
         <p:nvSpPr>
-          <p:cNvPr id="66" name="Google Shape;66;p14"/>
-          <p:cNvSpPr/>
+          <p:cNvPr id="61" name="Google Shape;61;p13"/>
+          <p:cNvSpPr txBox="1"/>
           <p:nvPr/>
         </p:nvSpPr>
         <p:spPr>
           <a:xfrm>
-            <a:off x="228598" y="331691"/>
-            <a:ext cx="4572000" cy="468600"/>
+            <a:off x="313775" y="2716963"/>
+            <a:ext cx="4395600" cy="373800"/>
           </a:xfrm>
           <a:prstGeom prst="rect">
             <a:avLst/>
@@ -6742,125 +6559,39 @@
           </a:ln>
         </p:spPr>
         <p:txBody>
-          <a:bodyPr anchorCtr="0" anchor="t" bIns="34275" lIns="34275" spcFirstLastPara="1" rIns="34275" wrap="square" tIns="34275">
+          <a:bodyPr anchorCtr="0" anchor="t" bIns="91425" lIns="91425" spcFirstLastPara="1" rIns="91425" wrap="square" tIns="91425">
             <a:noAutofit/>
           </a:bodyPr>
           <a:lstStyle/>
           <a:p>
-            <a:pPr indent="0" lvl="0" marL="0" marR="0" rtl="0" algn="l">
-              <a:lnSpc>
-                <a:spcPct val="100000"/>
-              </a:lnSpc>
-              <a:spcBef>
-                <a:spcPts val="0"/>
-              </a:spcBef>
-              <a:spcAft>
-                <a:spcPts val="0"/>
-              </a:spcAft>
-              <a:buClr>
-                <a:srgbClr val="F2F2F2"/>
-              </a:buClr>
-              <a:buSzPts val="2600"/>
-              <a:buFont typeface="Open Sans"/>
-              <a:buNone/>
+            <a:pPr indent="-317500" lvl="0" marL="457200" rtl="0" algn="l">
+              <a:spcBef>
+                <a:spcPts val="0"/>
+              </a:spcBef>
+              <a:spcAft>
+                <a:spcPts val="0"/>
+              </a:spcAft>
+              <a:buSzPts val="1400"/>
+              <a:buChar char="❏"/>
             </a:pPr>
             <a:r>
-              <a:rPr b="1" i="0" lang="en" sz="2600" u="none" cap="none" strike="noStrike">
-                <a:solidFill>
-                  <a:srgbClr val="F2F2F2"/>
-                </a:solidFill>
-                <a:latin typeface="Open Sans"/>
-                <a:ea typeface="Open Sans"/>
-                <a:cs typeface="Open Sans"/>
-                <a:sym typeface="Open Sans"/>
-              </a:rPr>
-              <a:t>A</a:t>
+              <a:rPr lang="en"/>
+              <a:t>Use Cases</a:t>
             </a:r>
-            <a:r>
-              <a:rPr b="1" lang="en" sz="2600">
-                <a:solidFill>
-                  <a:srgbClr val="F2F2F2"/>
-                </a:solidFill>
-                <a:latin typeface="Open Sans"/>
-                <a:ea typeface="Open Sans"/>
-                <a:cs typeface="Open Sans"/>
-                <a:sym typeface="Open Sans"/>
-              </a:rPr>
-              <a:t>mazon Comprehend</a:t>
-            </a:r>
-            <a:endParaRPr sz="1100"/>
+            <a:endParaRPr/>
           </a:p>
         </p:txBody>
       </p:sp>
       <p:sp>
         <p:nvSpPr>
-          <p:cNvPr id="67" name="Google Shape;67;p14"/>
-          <p:cNvSpPr/>
+          <p:cNvPr id="62" name="Google Shape;62;p13"/>
+          <p:cNvSpPr txBox="1"/>
           <p:nvPr/>
         </p:nvSpPr>
         <p:spPr>
           <a:xfrm>
-            <a:off x="313771" y="843754"/>
-            <a:ext cx="2789700" cy="34200"/>
-          </a:xfrm>
-          <a:prstGeom prst="rect">
-            <a:avLst/>
-          </a:prstGeom>
-          <a:solidFill>
-            <a:srgbClr val="DE6E22"/>
-          </a:solidFill>
-          <a:ln>
-            <a:noFill/>
-          </a:ln>
-        </p:spPr>
-        <p:txBody>
-          <a:bodyPr anchorCtr="0" anchor="ctr" bIns="34275" lIns="34275" spcFirstLastPara="1" rIns="34275" wrap="square" tIns="34275">
-            <a:noAutofit/>
-          </a:bodyPr>
-          <a:lstStyle/>
-          <a:p>
-            <a:pPr indent="0" lvl="0" marL="0" marR="0" rtl="0" algn="ctr">
-              <a:lnSpc>
-                <a:spcPct val="100000"/>
-              </a:lnSpc>
-              <a:spcBef>
-                <a:spcPts val="0"/>
-              </a:spcBef>
-              <a:spcAft>
-                <a:spcPts val="0"/>
-              </a:spcAft>
-              <a:buClr>
-                <a:srgbClr val="FFFFFF"/>
-              </a:buClr>
-              <a:buSzPts val="1400"/>
-              <a:buFont typeface="Calibri"/>
-              <a:buNone/>
-            </a:pPr>
-            <a:r>
-              <a:t/>
-            </a:r>
-            <a:endParaRPr b="0" i="0" sz="1400" u="none" cap="none" strike="noStrike">
-              <a:solidFill>
-                <a:srgbClr val="FFFFFF"/>
-              </a:solidFill>
-              <a:latin typeface="Calibri"/>
-              <a:ea typeface="Calibri"/>
-              <a:cs typeface="Calibri"/>
-              <a:sym typeface="Calibri"/>
-            </a:endParaRPr>
-          </a:p>
-        </p:txBody>
-      </p:sp>
-      <p:sp>
-        <p:nvSpPr>
-          <p:cNvPr id="68" name="Google Shape;68;p14"/>
-          <p:cNvSpPr/>
-          <p:nvPr/>
-        </p:nvSpPr>
-        <p:spPr>
-          <a:xfrm>
-            <a:off x="228601" y="952975"/>
-            <a:ext cx="2419500" cy="335100"/>
+            <a:off x="313775" y="3064306"/>
+            <a:ext cx="4395600" cy="373800"/>
           </a:xfrm>
           <a:prstGeom prst="rect">
             <a:avLst/>
@@ -6871,62 +6602,39 @@
           </a:ln>
         </p:spPr>
         <p:txBody>
-          <a:bodyPr anchorCtr="0" anchor="t" bIns="34275" lIns="34275" spcFirstLastPara="1" rIns="34275" wrap="square" tIns="34275">
+          <a:bodyPr anchorCtr="0" anchor="t" bIns="91425" lIns="91425" spcFirstLastPara="1" rIns="91425" wrap="square" tIns="91425">
             <a:noAutofit/>
           </a:bodyPr>
           <a:lstStyle/>
           <a:p>
-            <a:pPr indent="0" lvl="0" marL="0" marR="0" rtl="0" algn="l">
-              <a:lnSpc>
-                <a:spcPct val="100000"/>
-              </a:lnSpc>
-              <a:spcBef>
-                <a:spcPts val="0"/>
-              </a:spcBef>
-              <a:spcAft>
-                <a:spcPts val="0"/>
-              </a:spcAft>
-              <a:buClr>
-                <a:srgbClr val="D9D9D9"/>
-              </a:buClr>
-              <a:buSzPts val="1700"/>
-              <a:buFont typeface="Open Sans"/>
-              <a:buNone/>
+            <a:pPr indent="-317500" lvl="0" marL="457200" rtl="0" algn="l">
+              <a:spcBef>
+                <a:spcPts val="0"/>
+              </a:spcBef>
+              <a:spcAft>
+                <a:spcPts val="0"/>
+              </a:spcAft>
+              <a:buSzPts val="1400"/>
+              <a:buChar char="❏"/>
             </a:pPr>
             <a:r>
-              <a:rPr lang="en" sz="1700">
-                <a:solidFill>
-                  <a:srgbClr val="D9D9D9"/>
-                </a:solidFill>
-                <a:latin typeface="Open Sans"/>
-                <a:ea typeface="Open Sans"/>
-                <a:cs typeface="Open Sans"/>
-                <a:sym typeface="Open Sans"/>
-              </a:rPr>
-              <a:t>What is it?</a:t>
+              <a:rPr lang="en"/>
+              <a:t>API and CLI Labs</a:t>
             </a:r>
-            <a:endParaRPr sz="1100"/>
+            <a:endParaRPr/>
           </a:p>
         </p:txBody>
       </p:sp>
-      <p:pic>
-        <p:nvPicPr>
-          <p:cNvPr id="69" name="Google Shape;69;p14"/>
-          <p:cNvPicPr preferRelativeResize="0"/>
+      <p:sp>
+        <p:nvSpPr>
+          <p:cNvPr id="63" name="Google Shape;63;p13"/>
+          <p:cNvSpPr txBox="1"/>
           <p:nvPr/>
-        </p:nvPicPr>
-        <p:blipFill>
-          <a:blip r:embed="rId4">
-            <a:alphaModFix/>
-          </a:blip>
-          <a:stretch>
-            <a:fillRect/>
-          </a:stretch>
-        </p:blipFill>
-        <p:spPr>
-          <a:xfrm>
-            <a:off x="8325525" y="4593059"/>
-            <a:ext cx="752475" cy="495300"/>
+        </p:nvSpPr>
+        <p:spPr>
+          <a:xfrm>
+            <a:off x="313775" y="3411650"/>
+            <a:ext cx="4395600" cy="373800"/>
           </a:xfrm>
           <a:prstGeom prst="rect">
             <a:avLst/>
@@ -6936,7 +6644,30 @@
             <a:noFill/>
           </a:ln>
         </p:spPr>
-      </p:pic>
+        <p:txBody>
+          <a:bodyPr anchorCtr="0" anchor="t" bIns="91425" lIns="91425" spcFirstLastPara="1" rIns="91425" wrap="square" tIns="91425">
+            <a:noAutofit/>
+          </a:bodyPr>
+          <a:lstStyle/>
+          <a:p>
+            <a:pPr indent="-317500" lvl="0" marL="457200" rtl="0" algn="l">
+              <a:spcBef>
+                <a:spcPts val="0"/>
+              </a:spcBef>
+              <a:spcAft>
+                <a:spcPts val="0"/>
+              </a:spcAft>
+              <a:buSzPts val="1400"/>
+              <a:buChar char="❏"/>
+            </a:pPr>
+            <a:r>
+              <a:rPr lang="en"/>
+              <a:t>Exam Tips</a:t>
+            </a:r>
+            <a:endParaRPr/>
+          </a:p>
+        </p:txBody>
+      </p:sp>
     </p:spTree>
   </p:cSld>
   <p:clrMapOvr>
@@ -6950,6 +6681,218 @@
             <p:seq concurrent="1" nextAc="seek">
               <p:cTn dur="indefinite" id="2" nodeType="mainSeq">
                 <p:childTnLst>
+                  <p:par>
+                    <p:cTn fill="hold">
+                      <p:stCondLst>
+                        <p:cond delay="indefinite"/>
+                      </p:stCondLst>
+                      <p:childTnLst>
+                        <p:par>
+                          <p:cTn fill="hold">
+                            <p:stCondLst>
+                              <p:cond delay="0"/>
+                            </p:stCondLst>
+                            <p:childTnLst>
+                              <p:par>
+                                <p:cTn fill="hold" nodeType="clickEffect" presetClass="entr" presetID="10" presetSubtype="0">
+                                  <p:stCondLst>
+                                    <p:cond delay="0"/>
+                                  </p:stCondLst>
+                                  <p:childTnLst>
+                                    <p:set>
+                                      <p:cBhvr>
+                                        <p:cTn dur="1" fill="hold">
+                                          <p:stCondLst>
+                                            <p:cond delay="0"/>
+                                          </p:stCondLst>
+                                        </p:cTn>
+                                        <p:tgtEl>
+                                          <p:spTgt spid="59"/>
+                                        </p:tgtEl>
+                                        <p:attrNameLst>
+                                          <p:attrName>style.visibility</p:attrName>
+                                        </p:attrNameLst>
+                                      </p:cBhvr>
+                                      <p:to>
+                                        <p:strVal val="visible"/>
+                                      </p:to>
+                                    </p:set>
+                                    <p:animEffect filter="fade" transition="in">
+                                      <p:cBhvr>
+                                        <p:cTn dur="1000"/>
+                                        <p:tgtEl>
+                                          <p:spTgt spid="59"/>
+                                        </p:tgtEl>
+                                      </p:cBhvr>
+                                    </p:animEffect>
+                                  </p:childTnLst>
+                                </p:cTn>
+                              </p:par>
+                            </p:childTnLst>
+                          </p:cTn>
+                        </p:par>
+                      </p:childTnLst>
+                    </p:cTn>
+                  </p:par>
+                  <p:par>
+                    <p:cTn fill="hold">
+                      <p:stCondLst>
+                        <p:cond delay="indefinite"/>
+                      </p:stCondLst>
+                      <p:childTnLst>
+                        <p:par>
+                          <p:cTn fill="hold">
+                            <p:stCondLst>
+                              <p:cond delay="0"/>
+                            </p:stCondLst>
+                            <p:childTnLst>
+                              <p:par>
+                                <p:cTn fill="hold" nodeType="clickEffect" presetClass="entr" presetID="10" presetSubtype="0">
+                                  <p:stCondLst>
+                                    <p:cond delay="0"/>
+                                  </p:stCondLst>
+                                  <p:childTnLst>
+                                    <p:set>
+                                      <p:cBhvr>
+                                        <p:cTn dur="1" fill="hold">
+                                          <p:stCondLst>
+                                            <p:cond delay="0"/>
+                                          </p:stCondLst>
+                                        </p:cTn>
+                                        <p:tgtEl>
+                                          <p:spTgt spid="60"/>
+                                        </p:tgtEl>
+                                        <p:attrNameLst>
+                                          <p:attrName>style.visibility</p:attrName>
+                                        </p:attrNameLst>
+                                      </p:cBhvr>
+                                      <p:to>
+                                        <p:strVal val="visible"/>
+                                      </p:to>
+                                    </p:set>
+                                    <p:animEffect filter="fade" transition="in">
+                                      <p:cBhvr>
+                                        <p:cTn dur="1000"/>
+                                        <p:tgtEl>
+                                          <p:spTgt spid="60"/>
+                                        </p:tgtEl>
+                                      </p:cBhvr>
+                                    </p:animEffect>
+                                  </p:childTnLst>
+                                </p:cTn>
+                              </p:par>
+                            </p:childTnLst>
+                          </p:cTn>
+                        </p:par>
+                      </p:childTnLst>
+                    </p:cTn>
+                  </p:par>
+                  <p:par>
+                    <p:cTn fill="hold">
+                      <p:stCondLst>
+                        <p:cond delay="indefinite"/>
+                      </p:stCondLst>
+                      <p:childTnLst>
+                        <p:par>
+                          <p:cTn fill="hold">
+                            <p:stCondLst>
+                              <p:cond delay="0"/>
+                            </p:stCondLst>
+                            <p:childTnLst>
+                              <p:par>
+                                <p:cTn fill="hold" nodeType="clickEffect" presetClass="entr" presetID="10" presetSubtype="0">
+                                  <p:stCondLst>
+                                    <p:cond delay="0"/>
+                                  </p:stCondLst>
+                                  <p:childTnLst>
+                                    <p:set>
+                                      <p:cBhvr>
+                                        <p:cTn dur="1" fill="hold">
+                                          <p:stCondLst>
+                                            <p:cond delay="0"/>
+                                          </p:stCondLst>
+                                        </p:cTn>
+                                        <p:tgtEl>
+                                          <p:spTgt spid="61"/>
+                                        </p:tgtEl>
+                                        <p:attrNameLst>
+                                          <p:attrName>style.visibility</p:attrName>
+                                        </p:attrNameLst>
+                                      </p:cBhvr>
+                                      <p:to>
+                                        <p:strVal val="visible"/>
+                                      </p:to>
+                                    </p:set>
+                                    <p:animEffect filter="fade" transition="in">
+                                      <p:cBhvr>
+                                        <p:cTn dur="1000"/>
+                                        <p:tgtEl>
+                                          <p:spTgt spid="61"/>
+                                        </p:tgtEl>
+                                      </p:cBhvr>
+                                    </p:animEffect>
+                                  </p:childTnLst>
+                                </p:cTn>
+                              </p:par>
+                            </p:childTnLst>
+                          </p:cTn>
+                        </p:par>
+                      </p:childTnLst>
+                    </p:cTn>
+                  </p:par>
+                  <p:par>
+                    <p:cTn fill="hold">
+                      <p:stCondLst>
+                        <p:cond delay="indefinite"/>
+                      </p:stCondLst>
+                      <p:childTnLst>
+                        <p:par>
+                          <p:cTn fill="hold">
+                            <p:stCondLst>
+                              <p:cond delay="0"/>
+                            </p:stCondLst>
+                            <p:childTnLst>
+                              <p:par>
+                                <p:cTn fill="hold" nodeType="clickEffect" presetClass="entr" presetID="10" presetSubtype="0">
+                                  <p:stCondLst>
+                                    <p:cond delay="0"/>
+                                  </p:stCondLst>
+                                  <p:childTnLst>
+                                    <p:set>
+                                      <p:cBhvr>
+                                        <p:cTn dur="1" fill="hold">
+                                          <p:stCondLst>
+                                            <p:cond delay="0"/>
+                                          </p:stCondLst>
+                                        </p:cTn>
+                                        <p:tgtEl>
+                                          <p:spTgt spid="62"/>
+                                        </p:tgtEl>
+                                        <p:attrNameLst>
+                                          <p:attrName>style.visibility</p:attrName>
+                                        </p:attrNameLst>
+                                      </p:cBhvr>
+                                      <p:to>
+                                        <p:strVal val="visible"/>
+                                      </p:to>
+                                    </p:set>
+                                    <p:animEffect filter="fade" transition="in">
+                                      <p:cBhvr>
+                                        <p:cTn dur="1000"/>
+                                        <p:tgtEl>
+                                          <p:spTgt spid="62"/>
+                                        </p:tgtEl>
+                                      </p:cBhvr>
+                                    </p:animEffect>
+                                  </p:childTnLst>
+                                </p:cTn>
+                              </p:par>
+                            </p:childTnLst>
+                          </p:cTn>
+                        </p:par>
+                      </p:childTnLst>
+                    </p:cTn>
+                  </p:par>
                   <p:par>
                     <p:cTn fill="hold">
                       <p:stCondLst>
@@ -7028,12 +6971,12 @@
 </p:sld>
 </file>
 
-<file path=ppt/slides/slide3.xml><?xml version="1.0" encoding="utf-8"?>
+<file path=ppt/slides/slide2.xml><?xml version="1.0" encoding="utf-8"?>
 <p:sld xmlns:a="http://schemas.openxmlformats.org/drawingml/2006/main" xmlns:r="http://schemas.openxmlformats.org/officeDocument/2006/relationships" xmlns:mc="http://schemas.openxmlformats.org/markup-compatibility/2006" xmlns:mv="urn:schemas-microsoft-com:mac:vml" xmlns:p="http://schemas.openxmlformats.org/presentationml/2006/main" xmlns:c="http://schemas.openxmlformats.org/drawingml/2006/chart" xmlns:dgm="http://schemas.openxmlformats.org/drawingml/2006/diagram" xmlns:o="urn:schemas-microsoft-com:office:office" xmlns:v="urn:schemas-microsoft-com:vml" xmlns:pvml="urn:schemas-microsoft-com:office:powerpoint" xmlns:com="http://schemas.openxmlformats.org/drawingml/2006/compatibility" xmlns:p14="http://schemas.microsoft.com/office/powerpoint/2010/main" xmlns:p15="http://schemas.microsoft.com/office/powerpoint/2012/main">
   <p:cSld>
     <p:spTree>
       <p:nvGrpSpPr>
-        <p:cNvPr id="73" name="Shape 73"/>
+        <p:cNvPr id="67" name="Shape 67"/>
         <p:cNvGrpSpPr/>
         <p:nvPr/>
       </p:nvGrpSpPr>
@@ -7045,9 +6988,59 @@
           <a:chExt cx="0" cy="0"/>
         </a:xfrm>
       </p:grpSpPr>
+      <p:sp>
+        <p:nvSpPr>
+          <p:cNvPr id="68" name="Google Shape;68;p14"/>
+          <p:cNvSpPr txBox="1"/>
+          <p:nvPr/>
+        </p:nvSpPr>
+        <p:spPr>
+          <a:xfrm>
+            <a:off x="515475" y="3417800"/>
+            <a:ext cx="8292300" cy="1086900"/>
+          </a:xfrm>
+          <a:prstGeom prst="rect">
+            <a:avLst/>
+          </a:prstGeom>
+          <a:noFill/>
+          <a:ln>
+            <a:noFill/>
+          </a:ln>
+        </p:spPr>
+        <p:txBody>
+          <a:bodyPr anchorCtr="0" anchor="t" bIns="91425" lIns="91425" spcFirstLastPara="1" rIns="91425" wrap="square" tIns="91425">
+            <a:noAutofit/>
+          </a:bodyPr>
+          <a:lstStyle/>
+          <a:p>
+            <a:pPr indent="0" lvl="0" marL="0" rtl="0" algn="ctr">
+              <a:spcBef>
+                <a:spcPts val="0"/>
+              </a:spcBef>
+              <a:spcAft>
+                <a:spcPts val="0"/>
+              </a:spcAft>
+              <a:buNone/>
+            </a:pPr>
+            <a:r>
+              <a:rPr lang="en" sz="3000">
+                <a:solidFill>
+                  <a:schemeClr val="dk2"/>
+                </a:solidFill>
+              </a:rPr>
+              <a:t>A machine learning driven service that allows you to discover insights and relationships in text</a:t>
+            </a:r>
+            <a:endParaRPr sz="3000">
+              <a:solidFill>
+                <a:schemeClr val="dk2"/>
+              </a:solidFill>
+            </a:endParaRPr>
+          </a:p>
+        </p:txBody>
+      </p:sp>
       <p:pic>
         <p:nvPicPr>
-          <p:cNvPr id="74" name="Google Shape;74;p15"/>
+          <p:cNvPr id="69" name="Google Shape;69;p14"/>
           <p:cNvPicPr preferRelativeResize="0"/>
           <p:nvPr/>
         </p:nvPicPr>
@@ -7061,8 +7054,8 @@
         </p:blipFill>
         <p:spPr>
           <a:xfrm>
-            <a:off x="694225" y="1508975"/>
-            <a:ext cx="7620000" cy="3438525"/>
+            <a:off x="3347175" y="1640500"/>
+            <a:ext cx="2628900" cy="1390650"/>
           </a:xfrm>
           <a:prstGeom prst="rect">
             <a:avLst/>
@@ -7075,7 +7068,7 @@
       </p:pic>
       <p:sp>
         <p:nvSpPr>
-          <p:cNvPr id="75" name="Google Shape;75;p15"/>
+          <p:cNvPr id="70" name="Google Shape;70;p14"/>
           <p:cNvSpPr/>
           <p:nvPr/>
         </p:nvSpPr>
@@ -7141,7 +7134,396 @@
       </p:sp>
       <p:sp>
         <p:nvSpPr>
-          <p:cNvPr id="76" name="Google Shape;76;p15"/>
+          <p:cNvPr id="71" name="Google Shape;71;p14"/>
+          <p:cNvSpPr/>
+          <p:nvPr/>
+        </p:nvSpPr>
+        <p:spPr>
+          <a:xfrm>
+            <a:off x="228598" y="331691"/>
+            <a:ext cx="4572000" cy="468600"/>
+          </a:xfrm>
+          <a:prstGeom prst="rect">
+            <a:avLst/>
+          </a:prstGeom>
+          <a:noFill/>
+          <a:ln>
+            <a:noFill/>
+          </a:ln>
+        </p:spPr>
+        <p:txBody>
+          <a:bodyPr anchorCtr="0" anchor="t" bIns="34275" lIns="34275" spcFirstLastPara="1" rIns="34275" wrap="square" tIns="34275">
+            <a:noAutofit/>
+          </a:bodyPr>
+          <a:lstStyle/>
+          <a:p>
+            <a:pPr indent="0" lvl="0" marL="0" marR="0" rtl="0" algn="l">
+              <a:lnSpc>
+                <a:spcPct val="100000"/>
+              </a:lnSpc>
+              <a:spcBef>
+                <a:spcPts val="0"/>
+              </a:spcBef>
+              <a:spcAft>
+                <a:spcPts val="0"/>
+              </a:spcAft>
+              <a:buClr>
+                <a:srgbClr val="F2F2F2"/>
+              </a:buClr>
+              <a:buSzPts val="2600"/>
+              <a:buFont typeface="Open Sans"/>
+              <a:buNone/>
+            </a:pPr>
+            <a:r>
+              <a:rPr b="1" i="0" lang="en" sz="2600" u="none" cap="none" strike="noStrike">
+                <a:solidFill>
+                  <a:srgbClr val="F2F2F2"/>
+                </a:solidFill>
+                <a:latin typeface="Open Sans"/>
+                <a:ea typeface="Open Sans"/>
+                <a:cs typeface="Open Sans"/>
+                <a:sym typeface="Open Sans"/>
+              </a:rPr>
+              <a:t>A</a:t>
+            </a:r>
+            <a:r>
+              <a:rPr b="1" lang="en" sz="2600">
+                <a:solidFill>
+                  <a:srgbClr val="F2F2F2"/>
+                </a:solidFill>
+                <a:latin typeface="Open Sans"/>
+                <a:ea typeface="Open Sans"/>
+                <a:cs typeface="Open Sans"/>
+                <a:sym typeface="Open Sans"/>
+              </a:rPr>
+              <a:t>mazon Comprehend</a:t>
+            </a:r>
+            <a:endParaRPr sz="1100"/>
+          </a:p>
+        </p:txBody>
+      </p:sp>
+      <p:sp>
+        <p:nvSpPr>
+          <p:cNvPr id="72" name="Google Shape;72;p14"/>
+          <p:cNvSpPr/>
+          <p:nvPr/>
+        </p:nvSpPr>
+        <p:spPr>
+          <a:xfrm>
+            <a:off x="313771" y="843754"/>
+            <a:ext cx="2789700" cy="34200"/>
+          </a:xfrm>
+          <a:prstGeom prst="rect">
+            <a:avLst/>
+          </a:prstGeom>
+          <a:solidFill>
+            <a:srgbClr val="DE6E22"/>
+          </a:solidFill>
+          <a:ln>
+            <a:noFill/>
+          </a:ln>
+        </p:spPr>
+        <p:txBody>
+          <a:bodyPr anchorCtr="0" anchor="ctr" bIns="34275" lIns="34275" spcFirstLastPara="1" rIns="34275" wrap="square" tIns="34275">
+            <a:noAutofit/>
+          </a:bodyPr>
+          <a:lstStyle/>
+          <a:p>
+            <a:pPr indent="0" lvl="0" marL="0" marR="0" rtl="0" algn="ctr">
+              <a:lnSpc>
+                <a:spcPct val="100000"/>
+              </a:lnSpc>
+              <a:spcBef>
+                <a:spcPts val="0"/>
+              </a:spcBef>
+              <a:spcAft>
+                <a:spcPts val="0"/>
+              </a:spcAft>
+              <a:buClr>
+                <a:srgbClr val="FFFFFF"/>
+              </a:buClr>
+              <a:buSzPts val="1400"/>
+              <a:buFont typeface="Calibri"/>
+              <a:buNone/>
+            </a:pPr>
+            <a:r>
+              <a:t/>
+            </a:r>
+            <a:endParaRPr b="0" i="0" sz="1400" u="none" cap="none" strike="noStrike">
+              <a:solidFill>
+                <a:srgbClr val="FFFFFF"/>
+              </a:solidFill>
+              <a:latin typeface="Calibri"/>
+              <a:ea typeface="Calibri"/>
+              <a:cs typeface="Calibri"/>
+              <a:sym typeface="Calibri"/>
+            </a:endParaRPr>
+          </a:p>
+        </p:txBody>
+      </p:sp>
+      <p:sp>
+        <p:nvSpPr>
+          <p:cNvPr id="73" name="Google Shape;73;p14"/>
+          <p:cNvSpPr/>
+          <p:nvPr/>
+        </p:nvSpPr>
+        <p:spPr>
+          <a:xfrm>
+            <a:off x="228601" y="952975"/>
+            <a:ext cx="2419500" cy="335100"/>
+          </a:xfrm>
+          <a:prstGeom prst="rect">
+            <a:avLst/>
+          </a:prstGeom>
+          <a:noFill/>
+          <a:ln>
+            <a:noFill/>
+          </a:ln>
+        </p:spPr>
+        <p:txBody>
+          <a:bodyPr anchorCtr="0" anchor="t" bIns="34275" lIns="34275" spcFirstLastPara="1" rIns="34275" wrap="square" tIns="34275">
+            <a:noAutofit/>
+          </a:bodyPr>
+          <a:lstStyle/>
+          <a:p>
+            <a:pPr indent="0" lvl="0" marL="0" marR="0" rtl="0" algn="l">
+              <a:lnSpc>
+                <a:spcPct val="100000"/>
+              </a:lnSpc>
+              <a:spcBef>
+                <a:spcPts val="0"/>
+              </a:spcBef>
+              <a:spcAft>
+                <a:spcPts val="0"/>
+              </a:spcAft>
+              <a:buClr>
+                <a:srgbClr val="D9D9D9"/>
+              </a:buClr>
+              <a:buSzPts val="1700"/>
+              <a:buFont typeface="Open Sans"/>
+              <a:buNone/>
+            </a:pPr>
+            <a:r>
+              <a:rPr lang="en" sz="1700">
+                <a:solidFill>
+                  <a:srgbClr val="D9D9D9"/>
+                </a:solidFill>
+                <a:latin typeface="Open Sans"/>
+                <a:ea typeface="Open Sans"/>
+                <a:cs typeface="Open Sans"/>
+                <a:sym typeface="Open Sans"/>
+              </a:rPr>
+              <a:t>What is it?</a:t>
+            </a:r>
+            <a:endParaRPr sz="1100"/>
+          </a:p>
+        </p:txBody>
+      </p:sp>
+      <p:pic>
+        <p:nvPicPr>
+          <p:cNvPr id="74" name="Google Shape;74;p14"/>
+          <p:cNvPicPr preferRelativeResize="0"/>
+          <p:nvPr/>
+        </p:nvPicPr>
+        <p:blipFill>
+          <a:blip r:embed="rId4">
+            <a:alphaModFix/>
+          </a:blip>
+          <a:stretch>
+            <a:fillRect/>
+          </a:stretch>
+        </p:blipFill>
+        <p:spPr>
+          <a:xfrm>
+            <a:off x="8325525" y="4593059"/>
+            <a:ext cx="752475" cy="495300"/>
+          </a:xfrm>
+          <a:prstGeom prst="rect">
+            <a:avLst/>
+          </a:prstGeom>
+          <a:noFill/>
+          <a:ln>
+            <a:noFill/>
+          </a:ln>
+        </p:spPr>
+      </p:pic>
+    </p:spTree>
+  </p:cSld>
+  <p:clrMapOvr>
+    <a:masterClrMapping/>
+  </p:clrMapOvr>
+  <p:timing>
+    <p:tnLst>
+      <p:par>
+        <p:cTn dur="indefinite" nodeType="tmRoot" restart="never">
+          <p:childTnLst>
+            <p:seq concurrent="1" nextAc="seek">
+              <p:cTn dur="indefinite" id="2" nodeType="mainSeq">
+                <p:childTnLst>
+                  <p:par>
+                    <p:cTn fill="hold">
+                      <p:stCondLst>
+                        <p:cond delay="indefinite"/>
+                      </p:stCondLst>
+                      <p:childTnLst>
+                        <p:par>
+                          <p:cTn fill="hold">
+                            <p:stCondLst>
+                              <p:cond delay="0"/>
+                            </p:stCondLst>
+                            <p:childTnLst>
+                              <p:par>
+                                <p:cTn fill="hold" nodeType="clickEffect" presetClass="entr" presetID="10" presetSubtype="0">
+                                  <p:stCondLst>
+                                    <p:cond delay="0"/>
+                                  </p:stCondLst>
+                                  <p:childTnLst>
+                                    <p:set>
+                                      <p:cBhvr>
+                                        <p:cTn dur="1" fill="hold">
+                                          <p:stCondLst>
+                                            <p:cond delay="0"/>
+                                          </p:stCondLst>
+                                        </p:cTn>
+                                        <p:tgtEl>
+                                          <p:spTgt spid="68"/>
+                                        </p:tgtEl>
+                                        <p:attrNameLst>
+                                          <p:attrName>style.visibility</p:attrName>
+                                        </p:attrNameLst>
+                                      </p:cBhvr>
+                                      <p:to>
+                                        <p:strVal val="visible"/>
+                                      </p:to>
+                                    </p:set>
+                                    <p:animEffect filter="fade" transition="in">
+                                      <p:cBhvr>
+                                        <p:cTn dur="1000"/>
+                                        <p:tgtEl>
+                                          <p:spTgt spid="68"/>
+                                        </p:tgtEl>
+                                      </p:cBhvr>
+                                    </p:animEffect>
+                                  </p:childTnLst>
+                                </p:cTn>
+                              </p:par>
+                            </p:childTnLst>
+                          </p:cTn>
+                        </p:par>
+                      </p:childTnLst>
+                    </p:cTn>
+                  </p:par>
+                </p:childTnLst>
+              </p:cTn>
+              <p:prevCondLst>
+                <p:cond evt="onPrev">
+                  <p:tgtEl>
+                    <p:sldTgt/>
+                  </p:tgtEl>
+                </p:cond>
+              </p:prevCondLst>
+              <p:nextCondLst>
+                <p:cond evt="onNext">
+                  <p:tgtEl>
+                    <p:sldTgt/>
+                  </p:tgtEl>
+                </p:cond>
+              </p:nextCondLst>
+            </p:seq>
+          </p:childTnLst>
+        </p:cTn>
+      </p:par>
+    </p:tnLst>
+  </p:timing>
+</p:sld>
+</file>
+
+<file path=ppt/slides/slide3.xml><?xml version="1.0" encoding="utf-8"?>
+<p:sld xmlns:a="http://schemas.openxmlformats.org/drawingml/2006/main" xmlns:r="http://schemas.openxmlformats.org/officeDocument/2006/relationships" xmlns:mc="http://schemas.openxmlformats.org/markup-compatibility/2006" xmlns:mv="urn:schemas-microsoft-com:mac:vml" xmlns:p="http://schemas.openxmlformats.org/presentationml/2006/main" xmlns:c="http://schemas.openxmlformats.org/drawingml/2006/chart" xmlns:dgm="http://schemas.openxmlformats.org/drawingml/2006/diagram" xmlns:o="urn:schemas-microsoft-com:office:office" xmlns:v="urn:schemas-microsoft-com:vml" xmlns:pvml="urn:schemas-microsoft-com:office:powerpoint" xmlns:com="http://schemas.openxmlformats.org/drawingml/2006/compatibility" xmlns:p14="http://schemas.microsoft.com/office/powerpoint/2010/main" xmlns:p15="http://schemas.microsoft.com/office/powerpoint/2012/main">
+  <p:cSld>
+    <p:spTree>
+      <p:nvGrpSpPr>
+        <p:cNvPr id="78" name="Shape 78"/>
+        <p:cNvGrpSpPr/>
+        <p:nvPr/>
+      </p:nvGrpSpPr>
+      <p:grpSpPr>
+        <a:xfrm>
+          <a:off x="0" y="0"/>
+          <a:ext cx="0" cy="0"/>
+          <a:chOff x="0" y="0"/>
+          <a:chExt cx="0" cy="0"/>
+        </a:xfrm>
+      </p:grpSpPr>
+      <p:sp>
+        <p:nvSpPr>
+          <p:cNvPr id="79" name="Google Shape;79;p15"/>
+          <p:cNvSpPr/>
+          <p:nvPr/>
+        </p:nvSpPr>
+        <p:spPr>
+          <a:xfrm>
+            <a:off x="-179682" y="-308191"/>
+            <a:ext cx="9647400" cy="1688700"/>
+          </a:xfrm>
+          <a:prstGeom prst="rect">
+            <a:avLst/>
+          </a:prstGeom>
+          <a:solidFill>
+            <a:srgbClr val="002645"/>
+          </a:solidFill>
+          <a:ln>
+            <a:noFill/>
+          </a:ln>
+          <a:effectLst>
+            <a:outerShdw blurRad="50800" rotWithShape="0" dir="5400000" dist="38100">
+              <a:srgbClr val="000000">
+                <a:alpha val="40000"/>
+              </a:srgbClr>
+            </a:outerShdw>
+          </a:effectLst>
+        </p:spPr>
+        <p:txBody>
+          <a:bodyPr anchorCtr="0" anchor="ctr" bIns="34275" lIns="34275" spcFirstLastPara="1" rIns="34275" wrap="square" tIns="34275">
+            <a:noAutofit/>
+          </a:bodyPr>
+          <a:lstStyle/>
+          <a:p>
+            <a:pPr indent="0" lvl="0" marL="0" marR="0" rtl="0" algn="ctr">
+              <a:lnSpc>
+                <a:spcPct val="100000"/>
+              </a:lnSpc>
+              <a:spcBef>
+                <a:spcPts val="0"/>
+              </a:spcBef>
+              <a:spcAft>
+                <a:spcPts val="0"/>
+              </a:spcAft>
+              <a:buClr>
+                <a:srgbClr val="FFFFFF"/>
+              </a:buClr>
+              <a:buSzPts val="1400"/>
+              <a:buFont typeface="Calibri"/>
+              <a:buNone/>
+            </a:pPr>
+            <a:r>
+              <a:t/>
+            </a:r>
+            <a:endParaRPr b="0" i="0" sz="1400" u="none" cap="none" strike="noStrike">
+              <a:solidFill>
+                <a:srgbClr val="FFFFFF"/>
+              </a:solidFill>
+              <a:latin typeface="Calibri"/>
+              <a:ea typeface="Calibri"/>
+              <a:cs typeface="Calibri"/>
+              <a:sym typeface="Calibri"/>
+            </a:endParaRPr>
+          </a:p>
+        </p:txBody>
+      </p:sp>
+      <p:sp>
+        <p:nvSpPr>
+          <p:cNvPr id="80" name="Google Shape;80;p15"/>
           <p:cNvSpPr/>
           <p:nvPr/>
         </p:nvSpPr>
@@ -7199,7 +7581,7 @@
       </p:sp>
       <p:sp>
         <p:nvSpPr>
-          <p:cNvPr id="77" name="Google Shape;77;p15"/>
+          <p:cNvPr id="81" name="Google Shape;81;p15"/>
           <p:cNvSpPr/>
           <p:nvPr/>
         </p:nvSpPr>
@@ -7258,7 +7640,7 @@
       </p:sp>
       <p:sp>
         <p:nvSpPr>
-          <p:cNvPr id="78" name="Google Shape;78;p15"/>
+          <p:cNvPr id="82" name="Google Shape;82;p15"/>
           <p:cNvSpPr/>
           <p:nvPr/>
         </p:nvSpPr>
@@ -7281,10 +7663,7 @@
           </a:bodyPr>
           <a:lstStyle/>
           <a:p>
-            <a:pPr indent="0" lvl="0" marL="0" marR="0" rtl="0" algn="l">
-              <a:lnSpc>
-                <a:spcPct val="100000"/>
-              </a:lnSpc>
+            <a:pPr indent="0" lvl="0" marL="0" rtl="0" algn="l">
               <a:spcBef>
                 <a:spcPts val="0"/>
               </a:spcBef>
@@ -7299,7 +7678,16 @@
               <a:buNone/>
             </a:pPr>
             <a:r>
-              <a:t/>
+              <a:rPr lang="en" sz="1700">
+                <a:solidFill>
+                  <a:srgbClr val="D9D9D9"/>
+                </a:solidFill>
+                <a:latin typeface="Open Sans"/>
+                <a:ea typeface="Open Sans"/>
+                <a:cs typeface="Open Sans"/>
+                <a:sym typeface="Open Sans"/>
+              </a:rPr>
+              <a:t>How it works</a:t>
             </a:r>
             <a:endParaRPr sz="1100"/>
           </a:p>
@@ -7307,7 +7695,35 @@
       </p:sp>
       <p:pic>
         <p:nvPicPr>
-          <p:cNvPr id="79" name="Google Shape;79;p15"/>
+          <p:cNvPr id="83" name="Google Shape;83;p15"/>
+          <p:cNvPicPr preferRelativeResize="0"/>
+          <p:nvPr/>
+        </p:nvPicPr>
+        <p:blipFill>
+          <a:blip r:embed="rId3">
+            <a:alphaModFix/>
+          </a:blip>
+          <a:stretch>
+            <a:fillRect/>
+          </a:stretch>
+        </p:blipFill>
+        <p:spPr>
+          <a:xfrm>
+            <a:off x="8325525" y="4593059"/>
+            <a:ext cx="752475" cy="495300"/>
+          </a:xfrm>
+          <a:prstGeom prst="rect">
+            <a:avLst/>
+          </a:prstGeom>
+          <a:noFill/>
+          <a:ln>
+            <a:noFill/>
+          </a:ln>
+        </p:spPr>
+      </p:pic>
+      <p:pic>
+        <p:nvPicPr>
+          <p:cNvPr id="84" name="Google Shape;84;p15"/>
           <p:cNvPicPr preferRelativeResize="0"/>
           <p:nvPr/>
         </p:nvPicPr>
@@ -7321,8 +7737,8 @@
         </p:blipFill>
         <p:spPr>
           <a:xfrm>
-            <a:off x="8325525" y="4593059"/>
-            <a:ext cx="752475" cy="495300"/>
+            <a:off x="457675" y="1540275"/>
+            <a:ext cx="2098200" cy="2610150"/>
           </a:xfrm>
           <a:prstGeom prst="rect">
             <a:avLst/>
@@ -7333,11 +7749,256 @@
           </a:ln>
         </p:spPr>
       </p:pic>
+      <p:pic>
+        <p:nvPicPr>
+          <p:cNvPr id="85" name="Google Shape;85;p15"/>
+          <p:cNvPicPr preferRelativeResize="0"/>
+          <p:nvPr/>
+        </p:nvPicPr>
+        <p:blipFill>
+          <a:blip r:embed="rId5">
+            <a:alphaModFix/>
+          </a:blip>
+          <a:stretch>
+            <a:fillRect/>
+          </a:stretch>
+        </p:blipFill>
+        <p:spPr>
+          <a:xfrm>
+            <a:off x="2555875" y="1629024"/>
+            <a:ext cx="3072850" cy="2432650"/>
+          </a:xfrm>
+          <a:prstGeom prst="rect">
+            <a:avLst/>
+          </a:prstGeom>
+          <a:noFill/>
+          <a:ln>
+            <a:noFill/>
+          </a:ln>
+        </p:spPr>
+      </p:pic>
+      <p:pic>
+        <p:nvPicPr>
+          <p:cNvPr id="86" name="Google Shape;86;p15"/>
+          <p:cNvPicPr preferRelativeResize="0"/>
+          <p:nvPr/>
+        </p:nvPicPr>
+        <p:blipFill>
+          <a:blip r:embed="rId6">
+            <a:alphaModFix/>
+          </a:blip>
+          <a:stretch>
+            <a:fillRect/>
+          </a:stretch>
+        </p:blipFill>
+        <p:spPr>
+          <a:xfrm>
+            <a:off x="5628725" y="1678725"/>
+            <a:ext cx="3502284" cy="2245575"/>
+          </a:xfrm>
+          <a:prstGeom prst="rect">
+            <a:avLst/>
+          </a:prstGeom>
+          <a:noFill/>
+          <a:ln>
+            <a:noFill/>
+          </a:ln>
+        </p:spPr>
+      </p:pic>
     </p:spTree>
   </p:cSld>
   <p:clrMapOvr>
     <a:masterClrMapping/>
   </p:clrMapOvr>
+  <p:timing>
+    <p:tnLst>
+      <p:par>
+        <p:cTn dur="indefinite" nodeType="tmRoot" restart="never">
+          <p:childTnLst>
+            <p:seq concurrent="1" nextAc="seek">
+              <p:cTn dur="indefinite" id="2" nodeType="mainSeq">
+                <p:childTnLst>
+                  <p:par>
+                    <p:cTn fill="hold">
+                      <p:stCondLst>
+                        <p:cond delay="indefinite"/>
+                      </p:stCondLst>
+                      <p:childTnLst>
+                        <p:par>
+                          <p:cTn fill="hold">
+                            <p:stCondLst>
+                              <p:cond delay="0"/>
+                            </p:stCondLst>
+                            <p:childTnLst>
+                              <p:par>
+                                <p:cTn fill="hold" nodeType="clickEffect" presetClass="entr" presetID="10" presetSubtype="0">
+                                  <p:stCondLst>
+                                    <p:cond delay="0"/>
+                                  </p:stCondLst>
+                                  <p:childTnLst>
+                                    <p:set>
+                                      <p:cBhvr>
+                                        <p:cTn dur="1" fill="hold">
+                                          <p:stCondLst>
+                                            <p:cond delay="0"/>
+                                          </p:stCondLst>
+                                        </p:cTn>
+                                        <p:tgtEl>
+                                          <p:spTgt spid="84"/>
+                                        </p:tgtEl>
+                                        <p:attrNameLst>
+                                          <p:attrName>style.visibility</p:attrName>
+                                        </p:attrNameLst>
+                                      </p:cBhvr>
+                                      <p:to>
+                                        <p:strVal val="visible"/>
+                                      </p:to>
+                                    </p:set>
+                                    <p:animEffect filter="fade" transition="in">
+                                      <p:cBhvr>
+                                        <p:cTn dur="1000"/>
+                                        <p:tgtEl>
+                                          <p:spTgt spid="84"/>
+                                        </p:tgtEl>
+                                      </p:cBhvr>
+                                    </p:animEffect>
+                                  </p:childTnLst>
+                                </p:cTn>
+                              </p:par>
+                            </p:childTnLst>
+                          </p:cTn>
+                        </p:par>
+                      </p:childTnLst>
+                    </p:cTn>
+                  </p:par>
+                  <p:par>
+                    <p:cTn fill="hold">
+                      <p:stCondLst>
+                        <p:cond delay="indefinite"/>
+                      </p:stCondLst>
+                      <p:childTnLst>
+                        <p:par>
+                          <p:cTn fill="hold">
+                            <p:stCondLst>
+                              <p:cond delay="0"/>
+                            </p:stCondLst>
+                            <p:childTnLst>
+                              <p:par>
+                                <p:cTn fill="hold" nodeType="clickEffect" presetClass="entr" presetID="10" presetSubtype="0">
+                                  <p:stCondLst>
+                                    <p:cond delay="0"/>
+                                  </p:stCondLst>
+                                  <p:childTnLst>
+                                    <p:set>
+                                      <p:cBhvr>
+                                        <p:cTn dur="1" fill="hold">
+                                          <p:stCondLst>
+                                            <p:cond delay="0"/>
+                                          </p:stCondLst>
+                                        </p:cTn>
+                                        <p:tgtEl>
+                                          <p:spTgt spid="85"/>
+                                        </p:tgtEl>
+                                        <p:attrNameLst>
+                                          <p:attrName>style.visibility</p:attrName>
+                                        </p:attrNameLst>
+                                      </p:cBhvr>
+                                      <p:to>
+                                        <p:strVal val="visible"/>
+                                      </p:to>
+                                    </p:set>
+                                    <p:animEffect filter="fade" transition="in">
+                                      <p:cBhvr>
+                                        <p:cTn dur="1000"/>
+                                        <p:tgtEl>
+                                          <p:spTgt spid="85"/>
+                                        </p:tgtEl>
+                                      </p:cBhvr>
+                                    </p:animEffect>
+                                  </p:childTnLst>
+                                </p:cTn>
+                              </p:par>
+                            </p:childTnLst>
+                          </p:cTn>
+                        </p:par>
+                      </p:childTnLst>
+                    </p:cTn>
+                  </p:par>
+                  <p:par>
+                    <p:cTn fill="hold">
+                      <p:stCondLst>
+                        <p:cond delay="indefinite"/>
+                      </p:stCondLst>
+                      <p:childTnLst>
+                        <p:par>
+                          <p:cTn fill="hold">
+                            <p:stCondLst>
+                              <p:cond delay="0"/>
+                            </p:stCondLst>
+                            <p:childTnLst>
+                              <p:par>
+                                <p:cTn fill="hold" nodeType="clickEffect" presetClass="entr" presetID="10" presetSubtype="0">
+                                  <p:stCondLst>
+                                    <p:cond delay="0"/>
+                                  </p:stCondLst>
+                                  <p:childTnLst>
+                                    <p:set>
+                                      <p:cBhvr>
+                                        <p:cTn dur="1" fill="hold">
+                                          <p:stCondLst>
+                                            <p:cond delay="0"/>
+                                          </p:stCondLst>
+                                        </p:cTn>
+                                        <p:tgtEl>
+                                          <p:spTgt spid="86"/>
+                                        </p:tgtEl>
+                                        <p:attrNameLst>
+                                          <p:attrName>style.visibility</p:attrName>
+                                        </p:attrNameLst>
+                                      </p:cBhvr>
+                                      <p:to>
+                                        <p:strVal val="visible"/>
+                                      </p:to>
+                                    </p:set>
+                                    <p:animEffect filter="fade" transition="in">
+                                      <p:cBhvr>
+                                        <p:cTn dur="1000"/>
+                                        <p:tgtEl>
+                                          <p:spTgt spid="86"/>
+                                        </p:tgtEl>
+                                      </p:cBhvr>
+                                    </p:animEffect>
+                                  </p:childTnLst>
+                                </p:cTn>
+                              </p:par>
+                            </p:childTnLst>
+                          </p:cTn>
+                        </p:par>
+                      </p:childTnLst>
+                    </p:cTn>
+                  </p:par>
+                </p:childTnLst>
+              </p:cTn>
+              <p:prevCondLst>
+                <p:cond evt="onPrev">
+                  <p:tgtEl>
+                    <p:sldTgt/>
+                  </p:tgtEl>
+                </p:cond>
+              </p:prevCondLst>
+              <p:nextCondLst>
+                <p:cond evt="onNext">
+                  <p:tgtEl>
+                    <p:sldTgt/>
+                  </p:tgtEl>
+                </p:cond>
+              </p:nextCondLst>
+            </p:seq>
+          </p:childTnLst>
+        </p:cTn>
+      </p:par>
+    </p:tnLst>
+  </p:timing>
 </p:sld>
 </file>
 
@@ -7346,7 +8007,7 @@
   <p:cSld>
     <p:spTree>
       <p:nvGrpSpPr>
-        <p:cNvPr id="83" name="Shape 83"/>
+        <p:cNvPr id="90" name="Shape 90"/>
         <p:cNvGrpSpPr/>
         <p:nvPr/>
       </p:nvGrpSpPr>
@@ -7360,7 +8021,7 @@
       </p:grpSpPr>
       <p:pic>
         <p:nvPicPr>
-          <p:cNvPr id="84" name="Google Shape;84;p16"/>
+          <p:cNvPr id="91" name="Google Shape;91;p16"/>
           <p:cNvPicPr preferRelativeResize="0"/>
           <p:nvPr/>
         </p:nvPicPr>
@@ -7388,7 +8049,7 @@
       </p:pic>
       <p:pic>
         <p:nvPicPr>
-          <p:cNvPr id="85" name="Google Shape;85;p16"/>
+          <p:cNvPr id="92" name="Google Shape;92;p16"/>
           <p:cNvPicPr preferRelativeResize="0"/>
           <p:nvPr/>
         </p:nvPicPr>
@@ -7416,7 +8077,7 @@
       </p:pic>
       <p:sp>
         <p:nvSpPr>
-          <p:cNvPr id="86" name="Google Shape;86;p16"/>
+          <p:cNvPr id="93" name="Google Shape;93;p16"/>
           <p:cNvSpPr/>
           <p:nvPr/>
         </p:nvSpPr>
@@ -7482,7 +8143,7 @@
       </p:sp>
       <p:sp>
         <p:nvSpPr>
-          <p:cNvPr id="87" name="Google Shape;87;p16"/>
+          <p:cNvPr id="94" name="Google Shape;94;p16"/>
           <p:cNvSpPr/>
           <p:nvPr/>
         </p:nvSpPr>
@@ -7540,7 +8201,7 @@
       </p:sp>
       <p:sp>
         <p:nvSpPr>
-          <p:cNvPr id="88" name="Google Shape;88;p16"/>
+          <p:cNvPr id="95" name="Google Shape;95;p16"/>
           <p:cNvSpPr/>
           <p:nvPr/>
         </p:nvSpPr>
@@ -7599,7 +8260,7 @@
       </p:sp>
       <p:sp>
         <p:nvSpPr>
-          <p:cNvPr id="89" name="Google Shape;89;p16"/>
+          <p:cNvPr id="96" name="Google Shape;96;p16"/>
           <p:cNvSpPr/>
           <p:nvPr/>
         </p:nvSpPr>
@@ -7648,7 +8309,7 @@
       </p:sp>
       <p:sp>
         <p:nvSpPr>
-          <p:cNvPr id="90" name="Google Shape;90;p16"/>
+          <p:cNvPr id="97" name="Google Shape;97;p16"/>
           <p:cNvSpPr/>
           <p:nvPr/>
         </p:nvSpPr>
@@ -7717,7 +8378,7 @@
   <p:cSld>
     <p:spTree>
       <p:nvGrpSpPr>
-        <p:cNvPr id="94" name="Shape 94"/>
+        <p:cNvPr id="101" name="Shape 101"/>
         <p:cNvGrpSpPr/>
         <p:nvPr/>
       </p:nvGrpSpPr>
@@ -7731,7 +8392,7 @@
       </p:grpSpPr>
       <p:pic>
         <p:nvPicPr>
-          <p:cNvPr id="95" name="Google Shape;95;p17"/>
+          <p:cNvPr id="102" name="Google Shape;102;p17"/>
           <p:cNvPicPr preferRelativeResize="0"/>
           <p:nvPr/>
         </p:nvPicPr>
@@ -7759,7 +8420,7 @@
       </p:pic>
       <p:pic>
         <p:nvPicPr>
-          <p:cNvPr id="96" name="Google Shape;96;p17"/>
+          <p:cNvPr id="103" name="Google Shape;103;p17"/>
           <p:cNvPicPr preferRelativeResize="0"/>
           <p:nvPr/>
         </p:nvPicPr>
@@ -7787,7 +8448,7 @@
       </p:pic>
       <p:sp>
         <p:nvSpPr>
-          <p:cNvPr id="97" name="Google Shape;97;p17"/>
+          <p:cNvPr id="104" name="Google Shape;104;p17"/>
           <p:cNvSpPr/>
           <p:nvPr/>
         </p:nvSpPr>
@@ -7853,7 +8514,7 @@
       </p:sp>
       <p:sp>
         <p:nvSpPr>
-          <p:cNvPr id="98" name="Google Shape;98;p17"/>
+          <p:cNvPr id="105" name="Google Shape;105;p17"/>
           <p:cNvSpPr/>
           <p:nvPr/>
         </p:nvSpPr>
@@ -7911,7 +8572,7 @@
       </p:sp>
       <p:sp>
         <p:nvSpPr>
-          <p:cNvPr id="99" name="Google Shape;99;p17"/>
+          <p:cNvPr id="106" name="Google Shape;106;p17"/>
           <p:cNvSpPr/>
           <p:nvPr/>
         </p:nvSpPr>
@@ -7970,7 +8631,7 @@
       </p:sp>
       <p:sp>
         <p:nvSpPr>
-          <p:cNvPr id="100" name="Google Shape;100;p17"/>
+          <p:cNvPr id="107" name="Google Shape;107;p17"/>
           <p:cNvSpPr/>
           <p:nvPr/>
         </p:nvSpPr>
@@ -8019,7 +8680,7 @@
       </p:sp>
       <p:sp>
         <p:nvSpPr>
-          <p:cNvPr id="101" name="Google Shape;101;p17"/>
+          <p:cNvPr id="108" name="Google Shape;108;p17"/>
           <p:cNvSpPr/>
           <p:nvPr/>
         </p:nvSpPr>
@@ -8088,7 +8749,7 @@
   <p:cSld>
     <p:spTree>
       <p:nvGrpSpPr>
-        <p:cNvPr id="105" name="Shape 105"/>
+        <p:cNvPr id="112" name="Shape 112"/>
         <p:cNvGrpSpPr/>
         <p:nvPr/>
       </p:nvGrpSpPr>
@@ -8102,7 +8763,7 @@
       </p:grpSpPr>
       <p:pic>
         <p:nvPicPr>
-          <p:cNvPr id="106" name="Google Shape;106;p18"/>
+          <p:cNvPr id="113" name="Google Shape;113;p18"/>
           <p:cNvPicPr preferRelativeResize="0"/>
           <p:nvPr/>
         </p:nvPicPr>
@@ -8130,7 +8791,7 @@
       </p:pic>
       <p:pic>
         <p:nvPicPr>
-          <p:cNvPr id="107" name="Google Shape;107;p18"/>
+          <p:cNvPr id="114" name="Google Shape;114;p18"/>
           <p:cNvPicPr preferRelativeResize="0"/>
           <p:nvPr/>
         </p:nvPicPr>
@@ -8158,7 +8819,7 @@
       </p:pic>
       <p:sp>
         <p:nvSpPr>
-          <p:cNvPr id="108" name="Google Shape;108;p18"/>
+          <p:cNvPr id="115" name="Google Shape;115;p18"/>
           <p:cNvSpPr/>
           <p:nvPr/>
         </p:nvSpPr>
@@ -8224,7 +8885,7 @@
       </p:sp>
       <p:sp>
         <p:nvSpPr>
-          <p:cNvPr id="109" name="Google Shape;109;p18"/>
+          <p:cNvPr id="116" name="Google Shape;116;p18"/>
           <p:cNvSpPr/>
           <p:nvPr/>
         </p:nvSpPr>
@@ -8282,7 +8943,7 @@
       </p:sp>
       <p:sp>
         <p:nvSpPr>
-          <p:cNvPr id="110" name="Google Shape;110;p18"/>
+          <p:cNvPr id="117" name="Google Shape;117;p18"/>
           <p:cNvSpPr/>
           <p:nvPr/>
         </p:nvSpPr>
@@ -8341,7 +9002,7 @@
       </p:sp>
       <p:sp>
         <p:nvSpPr>
-          <p:cNvPr id="111" name="Google Shape;111;p18"/>
+          <p:cNvPr id="118" name="Google Shape;118;p18"/>
           <p:cNvSpPr/>
           <p:nvPr/>
         </p:nvSpPr>
@@ -8390,7 +9051,7 @@
       </p:sp>
       <p:sp>
         <p:nvSpPr>
-          <p:cNvPr id="112" name="Google Shape;112;p18"/>
+          <p:cNvPr id="119" name="Google Shape;119;p18"/>
           <p:cNvSpPr/>
           <p:nvPr/>
         </p:nvSpPr>
@@ -8459,7 +9120,7 @@
   <p:cSld>
     <p:spTree>
       <p:nvGrpSpPr>
-        <p:cNvPr id="116" name="Shape 116"/>
+        <p:cNvPr id="123" name="Shape 123"/>
         <p:cNvGrpSpPr/>
         <p:nvPr/>
       </p:nvGrpSpPr>
@@ -8473,7 +9134,7 @@
       </p:grpSpPr>
       <p:pic>
         <p:nvPicPr>
-          <p:cNvPr id="117" name="Google Shape;117;p19"/>
+          <p:cNvPr id="124" name="Google Shape;124;p19"/>
           <p:cNvPicPr preferRelativeResize="0"/>
           <p:nvPr/>
         </p:nvPicPr>
@@ -8487,8 +9148,8 @@
         </p:blipFill>
         <p:spPr>
           <a:xfrm>
-            <a:off x="457675" y="1540275"/>
-            <a:ext cx="2098200" cy="2610150"/>
+            <a:off x="1780571" y="1440750"/>
+            <a:ext cx="5558230" cy="1436725"/>
           </a:xfrm>
           <a:prstGeom prst="rect">
             <a:avLst/>
@@ -8497,11 +9158,18 @@
           <a:ln>
             <a:noFill/>
           </a:ln>
+          <a:effectLst>
+            <a:outerShdw blurRad="57150" rotWithShape="0" algn="bl" dir="5400000" dist="19050">
+              <a:srgbClr val="000000">
+                <a:alpha val="50000"/>
+              </a:srgbClr>
+            </a:outerShdw>
+          </a:effectLst>
         </p:spPr>
       </p:pic>
       <p:pic>
         <p:nvPicPr>
-          <p:cNvPr id="118" name="Google Shape;118;p19"/>
+          <p:cNvPr id="125" name="Google Shape;125;p19"/>
           <p:cNvPicPr preferRelativeResize="0"/>
           <p:nvPr/>
         </p:nvPicPr>
@@ -8515,8 +9183,8 @@
         </p:blipFill>
         <p:spPr>
           <a:xfrm>
-            <a:off x="2555875" y="1629024"/>
-            <a:ext cx="3072850" cy="2432650"/>
+            <a:off x="1780575" y="2918062"/>
+            <a:ext cx="5558226" cy="2148664"/>
           </a:xfrm>
           <a:prstGeom prst="rect">
             <a:avLst/>
@@ -8525,11 +9193,18 @@
           <a:ln>
             <a:noFill/>
           </a:ln>
+          <a:effectLst>
+            <a:outerShdw blurRad="57150" rotWithShape="0" algn="bl" dir="5400000" dist="19050">
+              <a:srgbClr val="000000">
+                <a:alpha val="50000"/>
+              </a:srgbClr>
+            </a:outerShdw>
+          </a:effectLst>
         </p:spPr>
       </p:pic>
       <p:pic>
         <p:nvPicPr>
-          <p:cNvPr id="119" name="Google Shape;119;p19"/>
+          <p:cNvPr id="126" name="Google Shape;126;p19"/>
           <p:cNvPicPr preferRelativeResize="0"/>
           <p:nvPr/>
         </p:nvPicPr>
@@ -8543,8 +9218,8 @@
         </p:blipFill>
         <p:spPr>
           <a:xfrm>
-            <a:off x="5628725" y="1678725"/>
-            <a:ext cx="3502284" cy="2245575"/>
+            <a:off x="8325525" y="4593059"/>
+            <a:ext cx="752475" cy="495300"/>
           </a:xfrm>
           <a:prstGeom prst="rect">
             <a:avLst/>
@@ -8555,37 +9230,9 @@
           </a:ln>
         </p:spPr>
       </p:pic>
-      <p:pic>
-        <p:nvPicPr>
-          <p:cNvPr id="120" name="Google Shape;120;p19"/>
-          <p:cNvPicPr preferRelativeResize="0"/>
-          <p:nvPr/>
-        </p:nvPicPr>
-        <p:blipFill>
-          <a:blip r:embed="rId6">
-            <a:alphaModFix/>
-          </a:blip>
-          <a:stretch>
-            <a:fillRect/>
-          </a:stretch>
-        </p:blipFill>
-        <p:spPr>
-          <a:xfrm>
-            <a:off x="8325525" y="4593059"/>
-            <a:ext cx="752475" cy="495300"/>
-          </a:xfrm>
-          <a:prstGeom prst="rect">
-            <a:avLst/>
-          </a:prstGeom>
-          <a:noFill/>
-          <a:ln>
-            <a:noFill/>
-          </a:ln>
-        </p:spPr>
-      </p:pic>
       <p:sp>
         <p:nvSpPr>
-          <p:cNvPr id="121" name="Google Shape;121;p19"/>
+          <p:cNvPr id="127" name="Google Shape;127;p19"/>
           <p:cNvSpPr/>
           <p:nvPr/>
         </p:nvSpPr>
@@ -8651,7 +9298,7 @@
       </p:sp>
       <p:sp>
         <p:nvSpPr>
-          <p:cNvPr id="122" name="Google Shape;122;p19"/>
+          <p:cNvPr id="128" name="Google Shape;128;p19"/>
           <p:cNvSpPr/>
           <p:nvPr/>
         </p:nvSpPr>
@@ -8701,7 +9348,7 @@
                 <a:cs typeface="Open Sans"/>
                 <a:sym typeface="Open Sans"/>
               </a:rPr>
-              <a:t>Amazon Comprehend</a:t>
+              <a:t>Demo</a:t>
             </a:r>
             <a:endParaRPr sz="1100"/>
           </a:p>
@@ -8709,7 +9356,7 @@
       </p:sp>
       <p:sp>
         <p:nvSpPr>
-          <p:cNvPr id="123" name="Google Shape;123;p19"/>
+          <p:cNvPr id="129" name="Google Shape;129;p19"/>
           <p:cNvSpPr/>
           <p:nvPr/>
         </p:nvSpPr>
@@ -8768,7 +9415,7 @@
       </p:sp>
       <p:sp>
         <p:nvSpPr>
-          <p:cNvPr id="124" name="Google Shape;124;p19"/>
+          <p:cNvPr id="130" name="Google Shape;130;p19"/>
           <p:cNvSpPr/>
           <p:nvPr/>
         </p:nvSpPr>
@@ -8817,7 +9464,7 @@
       </p:sp>
       <p:sp>
         <p:nvSpPr>
-          <p:cNvPr id="125" name="Google Shape;125;p19"/>
+          <p:cNvPr id="131" name="Google Shape;131;p19"/>
           <p:cNvSpPr/>
           <p:nvPr/>
         </p:nvSpPr>
@@ -8867,7 +9514,7 @@
                 <a:cs typeface="Open Sans"/>
                 <a:sym typeface="Open Sans"/>
               </a:rPr>
-              <a:t>How it works</a:t>
+              <a:t>Python API and CLI</a:t>
             </a:r>
             <a:endParaRPr sz="1100"/>
           </a:p>
@@ -8912,7 +9559,7 @@
                                           </p:stCondLst>
                                         </p:cTn>
                                         <p:tgtEl>
-                                          <p:spTgt spid="117"/>
+                                          <p:spTgt spid="124"/>
                                         </p:tgtEl>
                                         <p:attrNameLst>
                                           <p:attrName>style.visibility</p:attrName>
@@ -8924,9 +9571,9 @@
                                     </p:set>
                                     <p:animEffect filter="fade" transition="in">
                                       <p:cBhvr>
-                                        <p:cTn dur="2500"/>
+                                        <p:cTn dur="2600"/>
                                         <p:tgtEl>
-                                          <p:spTgt spid="117"/>
+                                          <p:spTgt spid="124"/>
                                         </p:tgtEl>
                                       </p:cBhvr>
                                     </p:animEffect>
@@ -8965,7 +9612,7 @@
                                           </p:stCondLst>
                                         </p:cTn>
                                         <p:tgtEl>
-                                          <p:spTgt spid="118"/>
+                                          <p:spTgt spid="125"/>
                                         </p:tgtEl>
                                         <p:attrNameLst>
                                           <p:attrName>style.visibility</p:attrName>
@@ -8977,62 +9624,9 @@
                                     </p:set>
                                     <p:animEffect filter="fade" transition="in">
                                       <p:cBhvr>
-                                        <p:cTn dur="2500"/>
+                                        <p:cTn dur="2600"/>
                                         <p:tgtEl>
-                                          <p:spTgt spid="118"/>
-                                        </p:tgtEl>
-                                      </p:cBhvr>
-                                    </p:animEffect>
-                                  </p:childTnLst>
-                                </p:cTn>
-                              </p:par>
-                            </p:childTnLst>
-                          </p:cTn>
-                        </p:par>
-                      </p:childTnLst>
-                    </p:cTn>
-                  </p:par>
-                  <p:par>
-                    <p:cTn fill="hold">
-                      <p:stCondLst>
-                        <p:cond delay="indefinite"/>
-                      </p:stCondLst>
-                      <p:childTnLst>
-                        <p:par>
-                          <p:cTn fill="hold">
-                            <p:stCondLst>
-                              <p:cond delay="0"/>
-                            </p:stCondLst>
-                            <p:childTnLst>
-                              <p:par>
-                                <p:cTn fill="hold" nodeType="clickEffect" presetClass="entr" presetID="10" presetSubtype="0">
-                                  <p:stCondLst>
-                                    <p:cond delay="0"/>
-                                  </p:stCondLst>
-                                  <p:childTnLst>
-                                    <p:set>
-                                      <p:cBhvr>
-                                        <p:cTn dur="1" fill="hold">
-                                          <p:stCondLst>
-                                            <p:cond delay="0"/>
-                                          </p:stCondLst>
-                                        </p:cTn>
-                                        <p:tgtEl>
-                                          <p:spTgt spid="119"/>
-                                        </p:tgtEl>
-                                        <p:attrNameLst>
-                                          <p:attrName>style.visibility</p:attrName>
-                                        </p:attrNameLst>
-                                      </p:cBhvr>
-                                      <p:to>
-                                        <p:strVal val="visible"/>
-                                      </p:to>
-                                    </p:set>
-                                    <p:animEffect filter="fade" transition="in">
-                                      <p:cBhvr>
-                                        <p:cTn dur="2500"/>
-                                        <p:tgtEl>
-                                          <p:spTgt spid="119"/>
+                                          <p:spTgt spid="125"/>
                                         </p:tgtEl>
                                       </p:cBhvr>
                                     </p:animEffect>
@@ -9075,7 +9669,7 @@
   <p:cSld>
     <p:spTree>
       <p:nvGrpSpPr>
-        <p:cNvPr id="129" name="Shape 129"/>
+        <p:cNvPr id="135" name="Shape 135"/>
         <p:cNvGrpSpPr/>
         <p:nvPr/>
       </p:nvGrpSpPr>
@@ -9089,7 +9683,7 @@
       </p:grpSpPr>
       <p:sp>
         <p:nvSpPr>
-          <p:cNvPr id="130" name="Google Shape;130;p20"/>
+          <p:cNvPr id="136" name="Google Shape;136;p20"/>
           <p:cNvSpPr txBox="1"/>
           <p:nvPr/>
         </p:nvSpPr>
@@ -9120,7 +9714,7 @@
                 <a:spcPts val="0"/>
               </a:spcAft>
               <a:buSzPts val="1400"/>
-              <a:buChar char="●"/>
+              <a:buChar char="❏"/>
             </a:pPr>
             <a:r>
               <a:rPr lang="en" sz="1200">
@@ -9139,7 +9733,7 @@
       </p:sp>
       <p:sp>
         <p:nvSpPr>
-          <p:cNvPr id="131" name="Google Shape;131;p20"/>
+          <p:cNvPr id="137" name="Google Shape;137;p20"/>
           <p:cNvSpPr txBox="1"/>
           <p:nvPr/>
         </p:nvSpPr>
@@ -9173,7 +9767,7 @@
                 <a:schemeClr val="dk1"/>
               </a:buClr>
               <a:buSzPts val="1400"/>
-              <a:buChar char="●"/>
+              <a:buChar char="❏"/>
             </a:pPr>
             <a:r>
               <a:rPr lang="en" sz="1200">
@@ -9186,32 +9780,13 @@
               </a:rPr>
               <a:t>The model is continuously trained on a large body of text; you don’t need to provide training data.</a:t>
             </a:r>
-            <a:endParaRPr>
-              <a:solidFill>
-                <a:schemeClr val="dk1"/>
-              </a:solidFill>
-            </a:endParaRPr>
-          </a:p>
-          <a:p>
-            <a:pPr indent="0" lvl="0" marL="0" rtl="0" algn="l">
-              <a:spcBef>
-                <a:spcPts val="0"/>
-              </a:spcBef>
-              <a:spcAft>
-                <a:spcPts val="0"/>
-              </a:spcAft>
-              <a:buNone/>
-            </a:pPr>
-            <a:r>
-              <a:t/>
-            </a:r>
             <a:endParaRPr/>
           </a:p>
         </p:txBody>
       </p:sp>
       <p:sp>
         <p:nvSpPr>
-          <p:cNvPr id="132" name="Google Shape;132;p20"/>
+          <p:cNvPr id="138" name="Google Shape;138;p20"/>
           <p:cNvSpPr txBox="1"/>
           <p:nvPr/>
         </p:nvSpPr>
@@ -9242,7 +9817,7 @@
                 <a:spcPts val="0"/>
               </a:spcAft>
               <a:buSzPts val="1400"/>
-              <a:buChar char="●"/>
+              <a:buChar char="❏"/>
             </a:pPr>
             <a:r>
               <a:rPr lang="en" sz="1200">
@@ -9261,7 +9836,7 @@
       </p:sp>
       <p:sp>
         <p:nvSpPr>
-          <p:cNvPr id="133" name="Google Shape;133;p20"/>
+          <p:cNvPr id="139" name="Google Shape;139;p20"/>
           <p:cNvSpPr txBox="1"/>
           <p:nvPr/>
         </p:nvSpPr>
@@ -9292,7 +9867,7 @@
                 <a:spcPts val="0"/>
               </a:spcAft>
               <a:buSzPts val="1200"/>
-              <a:buChar char="●"/>
+              <a:buChar char="❏"/>
             </a:pPr>
             <a:r>
               <a:rPr lang="en" sz="1200">
@@ -9333,7 +9908,7 @@
       </p:sp>
       <p:sp>
         <p:nvSpPr>
-          <p:cNvPr id="134" name="Google Shape;134;p20"/>
+          <p:cNvPr id="140" name="Google Shape;140;p20"/>
           <p:cNvSpPr txBox="1"/>
           <p:nvPr/>
         </p:nvSpPr>
@@ -9364,7 +9939,7 @@
                 <a:spcPts val="0"/>
               </a:spcAft>
               <a:buSzPts val="1200"/>
-              <a:buChar char="●"/>
+              <a:buChar char="❏"/>
             </a:pPr>
             <a:r>
               <a:rPr lang="en" sz="1200">
@@ -9420,7 +9995,7 @@
       </p:sp>
       <p:sp>
         <p:nvSpPr>
-          <p:cNvPr id="135" name="Google Shape;135;p20"/>
+          <p:cNvPr id="141" name="Google Shape;141;p20"/>
           <p:cNvSpPr txBox="1"/>
           <p:nvPr/>
         </p:nvSpPr>
@@ -9451,7 +10026,7 @@
                 <a:spcPts val="0"/>
               </a:spcAft>
               <a:buSzPts val="1200"/>
-              <a:buChar char="●"/>
+              <a:buChar char="❏"/>
             </a:pPr>
             <a:r>
               <a:rPr lang="en" sz="1200">
@@ -9492,7 +10067,7 @@
       </p:sp>
       <p:sp>
         <p:nvSpPr>
-          <p:cNvPr id="136" name="Google Shape;136;p20"/>
+          <p:cNvPr id="142" name="Google Shape;142;p20"/>
           <p:cNvSpPr txBox="1"/>
           <p:nvPr/>
         </p:nvSpPr>
@@ -9523,7 +10098,7 @@
                 <a:spcPts val="0"/>
               </a:spcAft>
               <a:buSzPts val="1200"/>
-              <a:buChar char="●"/>
+              <a:buChar char="❏"/>
             </a:pPr>
             <a:r>
               <a:rPr lang="en" sz="1200">
@@ -9564,7 +10139,7 @@
       </p:sp>
       <p:sp>
         <p:nvSpPr>
-          <p:cNvPr id="137" name="Google Shape;137;p20"/>
+          <p:cNvPr id="143" name="Google Shape;143;p20"/>
           <p:cNvSpPr txBox="1"/>
           <p:nvPr/>
         </p:nvSpPr>
@@ -9595,7 +10170,7 @@
                 <a:spcPts val="0"/>
               </a:spcAft>
               <a:buSzPts val="1200"/>
-              <a:buChar char="●"/>
+              <a:buChar char="❏"/>
             </a:pPr>
             <a:r>
               <a:rPr lang="en" sz="1200">
@@ -9629,7 +10204,7 @@
       </p:sp>
       <p:sp>
         <p:nvSpPr>
-          <p:cNvPr id="138" name="Google Shape;138;p20"/>
+          <p:cNvPr id="144" name="Google Shape;144;p20"/>
           <p:cNvSpPr txBox="1"/>
           <p:nvPr/>
         </p:nvSpPr>
@@ -9660,7 +10235,7 @@
                 <a:spcPts val="0"/>
               </a:spcAft>
               <a:buSzPts val="1200"/>
-              <a:buChar char="●"/>
+              <a:buChar char="❏"/>
             </a:pPr>
             <a:r>
               <a:rPr lang="en" sz="1200">
@@ -9701,7 +10276,7 @@
       </p:sp>
       <p:pic>
         <p:nvPicPr>
-          <p:cNvPr id="139" name="Google Shape;139;p20"/>
+          <p:cNvPr id="145" name="Google Shape;145;p20"/>
           <p:cNvPicPr preferRelativeResize="0"/>
           <p:nvPr/>
         </p:nvPicPr>
@@ -9729,7 +10304,7 @@
       </p:pic>
       <p:sp>
         <p:nvSpPr>
-          <p:cNvPr id="140" name="Google Shape;140;p20"/>
+          <p:cNvPr id="146" name="Google Shape;146;p20"/>
           <p:cNvSpPr/>
           <p:nvPr/>
         </p:nvSpPr>
@@ -9795,7 +10370,7 @@
       </p:sp>
       <p:sp>
         <p:nvSpPr>
-          <p:cNvPr id="141" name="Google Shape;141;p20"/>
+          <p:cNvPr id="147" name="Google Shape;147;p20"/>
           <p:cNvSpPr/>
           <p:nvPr/>
         </p:nvSpPr>
@@ -9853,7 +10428,7 @@
       </p:sp>
       <p:sp>
         <p:nvSpPr>
-          <p:cNvPr id="142" name="Google Shape;142;p20"/>
+          <p:cNvPr id="148" name="Google Shape;148;p20"/>
           <p:cNvSpPr/>
           <p:nvPr/>
         </p:nvSpPr>
@@ -9912,7 +10487,7 @@
       </p:sp>
       <p:sp>
         <p:nvSpPr>
-          <p:cNvPr id="143" name="Google Shape;143;p20"/>
+          <p:cNvPr id="149" name="Google Shape;149;p20"/>
           <p:cNvSpPr/>
           <p:nvPr/>
         </p:nvSpPr>
@@ -9961,7 +10536,7 @@
       </p:sp>
       <p:sp>
         <p:nvSpPr>
-          <p:cNvPr id="144" name="Google Shape;144;p20"/>
+          <p:cNvPr id="150" name="Google Shape;150;p20"/>
           <p:cNvSpPr/>
           <p:nvPr/>
         </p:nvSpPr>
@@ -10011,7 +10586,7 @@
                 <a:cs typeface="Open Sans"/>
                 <a:sym typeface="Open Sans"/>
               </a:rPr>
-              <a:t>Exam Notes</a:t>
+              <a:t>Exam Tips</a:t>
             </a:r>
             <a:endParaRPr sz="1100"/>
           </a:p>
@@ -10056,7 +10631,7 @@
                                           </p:stCondLst>
                                         </p:cTn>
                                         <p:tgtEl>
-                                          <p:spTgt spid="130"/>
+                                          <p:spTgt spid="136"/>
                                         </p:tgtEl>
                                         <p:attrNameLst>
                                           <p:attrName>style.visibility</p:attrName>
@@ -10070,7 +10645,7 @@
                                       <p:cBhvr>
                                         <p:cTn dur="2000"/>
                                         <p:tgtEl>
-                                          <p:spTgt spid="130"/>
+                                          <p:spTgt spid="136"/>
                                         </p:tgtEl>
                                       </p:cBhvr>
                                     </p:animEffect>
@@ -10109,7 +10684,7 @@
                                           </p:stCondLst>
                                         </p:cTn>
                                         <p:tgtEl>
-                                          <p:spTgt spid="131"/>
+                                          <p:spTgt spid="137"/>
                                         </p:tgtEl>
                                         <p:attrNameLst>
                                           <p:attrName>style.visibility</p:attrName>
@@ -10123,166 +10698,7 @@
                                       <p:cBhvr>
                                         <p:cTn dur="2000"/>
                                         <p:tgtEl>
-                                          <p:spTgt spid="131"/>
-                                        </p:tgtEl>
-                                      </p:cBhvr>
-                                    </p:animEffect>
-                                  </p:childTnLst>
-                                </p:cTn>
-                              </p:par>
-                            </p:childTnLst>
-                          </p:cTn>
-                        </p:par>
-                      </p:childTnLst>
-                    </p:cTn>
-                  </p:par>
-                  <p:par>
-                    <p:cTn fill="hold">
-                      <p:stCondLst>
-                        <p:cond delay="indefinite"/>
-                      </p:stCondLst>
-                      <p:childTnLst>
-                        <p:par>
-                          <p:cTn fill="hold">
-                            <p:stCondLst>
-                              <p:cond delay="0"/>
-                            </p:stCondLst>
-                            <p:childTnLst>
-                              <p:par>
-                                <p:cTn fill="hold" nodeType="clickEffect" presetClass="entr" presetID="10" presetSubtype="0">
-                                  <p:stCondLst>
-                                    <p:cond delay="0"/>
-                                  </p:stCondLst>
-                                  <p:childTnLst>
-                                    <p:set>
-                                      <p:cBhvr>
-                                        <p:cTn dur="1" fill="hold">
-                                          <p:stCondLst>
-                                            <p:cond delay="0"/>
-                                          </p:stCondLst>
-                                        </p:cTn>
-                                        <p:tgtEl>
-                                          <p:spTgt spid="132"/>
-                                        </p:tgtEl>
-                                        <p:attrNameLst>
-                                          <p:attrName>style.visibility</p:attrName>
-                                        </p:attrNameLst>
-                                      </p:cBhvr>
-                                      <p:to>
-                                        <p:strVal val="visible"/>
-                                      </p:to>
-                                    </p:set>
-                                    <p:animEffect filter="fade" transition="in">
-                                      <p:cBhvr>
-                                        <p:cTn dur="2000"/>
-                                        <p:tgtEl>
-                                          <p:spTgt spid="132"/>
-                                        </p:tgtEl>
-                                      </p:cBhvr>
-                                    </p:animEffect>
-                                  </p:childTnLst>
-                                </p:cTn>
-                              </p:par>
-                            </p:childTnLst>
-                          </p:cTn>
-                        </p:par>
-                      </p:childTnLst>
-                    </p:cTn>
-                  </p:par>
-                  <p:par>
-                    <p:cTn fill="hold">
-                      <p:stCondLst>
-                        <p:cond delay="indefinite"/>
-                      </p:stCondLst>
-                      <p:childTnLst>
-                        <p:par>
-                          <p:cTn fill="hold">
-                            <p:stCondLst>
-                              <p:cond delay="0"/>
-                            </p:stCondLst>
-                            <p:childTnLst>
-                              <p:par>
-                                <p:cTn fill="hold" nodeType="clickEffect" presetClass="entr" presetID="10" presetSubtype="0">
-                                  <p:stCondLst>
-                                    <p:cond delay="0"/>
-                                  </p:stCondLst>
-                                  <p:childTnLst>
-                                    <p:set>
-                                      <p:cBhvr>
-                                        <p:cTn dur="1" fill="hold">
-                                          <p:stCondLst>
-                                            <p:cond delay="0"/>
-                                          </p:stCondLst>
-                                        </p:cTn>
-                                        <p:tgtEl>
-                                          <p:spTgt spid="133"/>
-                                        </p:tgtEl>
-                                        <p:attrNameLst>
-                                          <p:attrName>style.visibility</p:attrName>
-                                        </p:attrNameLst>
-                                      </p:cBhvr>
-                                      <p:to>
-                                        <p:strVal val="visible"/>
-                                      </p:to>
-                                    </p:set>
-                                    <p:animEffect filter="fade" transition="in">
-                                      <p:cBhvr>
-                                        <p:cTn dur="2000"/>
-                                        <p:tgtEl>
-                                          <p:spTgt spid="133"/>
-                                        </p:tgtEl>
-                                      </p:cBhvr>
-                                    </p:animEffect>
-                                  </p:childTnLst>
-                                </p:cTn>
-                              </p:par>
-                            </p:childTnLst>
-                          </p:cTn>
-                        </p:par>
-                      </p:childTnLst>
-                    </p:cTn>
-                  </p:par>
-                  <p:par>
-                    <p:cTn fill="hold">
-                      <p:stCondLst>
-                        <p:cond delay="indefinite"/>
-                      </p:stCondLst>
-                      <p:childTnLst>
-                        <p:par>
-                          <p:cTn fill="hold">
-                            <p:stCondLst>
-                              <p:cond delay="0"/>
-                            </p:stCondLst>
-                            <p:childTnLst>
-                              <p:par>
-                                <p:cTn fill="hold" nodeType="clickEffect" presetClass="entr" presetID="10" presetSubtype="0">
-                                  <p:stCondLst>
-                                    <p:cond delay="0"/>
-                                  </p:stCondLst>
-                                  <p:childTnLst>
-                                    <p:set>
-                                      <p:cBhvr>
-                                        <p:cTn dur="1" fill="hold">
-                                          <p:stCondLst>
-                                            <p:cond delay="0"/>
-                                          </p:stCondLst>
-                                        </p:cTn>
-                                        <p:tgtEl>
-                                          <p:spTgt spid="134"/>
-                                        </p:tgtEl>
-                                        <p:attrNameLst>
-                                          <p:attrName>style.visibility</p:attrName>
-                                        </p:attrNameLst>
-                                      </p:cBhvr>
-                                      <p:to>
-                                        <p:strVal val="visible"/>
-                                      </p:to>
-                                    </p:set>
-                                    <p:animEffect filter="fade" transition="in">
-                                      <p:cBhvr>
-                                        <p:cTn dur="2000"/>
-                                        <p:tgtEl>
-                                          <p:spTgt spid="134"/>
+                                          <p:spTgt spid="137"/>
                                         </p:tgtEl>
                                       </p:cBhvr>
                                     </p:animEffect>
@@ -10374,7 +10790,7 @@
                                           </p:stCondLst>
                                         </p:cTn>
                                         <p:tgtEl>
-                                          <p:spTgt spid="136"/>
+                                          <p:spTgt spid="139"/>
                                         </p:tgtEl>
                                         <p:attrNameLst>
                                           <p:attrName>style.visibility</p:attrName>
@@ -10388,7 +10804,7 @@
                                       <p:cBhvr>
                                         <p:cTn dur="2000"/>
                                         <p:tgtEl>
-                                          <p:spTgt spid="136"/>
+                                          <p:spTgt spid="139"/>
                                         </p:tgtEl>
                                       </p:cBhvr>
                                     </p:animEffect>
@@ -10427,7 +10843,7 @@
                                           </p:stCondLst>
                                         </p:cTn>
                                         <p:tgtEl>
-                                          <p:spTgt spid="135"/>
+                                          <p:spTgt spid="140"/>
                                         </p:tgtEl>
                                         <p:attrNameLst>
                                           <p:attrName>style.visibility</p:attrName>
@@ -10441,7 +10857,7 @@
                                       <p:cBhvr>
                                         <p:cTn dur="2000"/>
                                         <p:tgtEl>
-                                          <p:spTgt spid="135"/>
+                                          <p:spTgt spid="140"/>
                                         </p:tgtEl>
                                       </p:cBhvr>
                                     </p:animEffect>
@@ -10480,7 +10896,7 @@
                                           </p:stCondLst>
                                         </p:cTn>
                                         <p:tgtEl>
-                                          <p:spTgt spid="137"/>
+                                          <p:spTgt spid="144"/>
                                         </p:tgtEl>
                                         <p:attrNameLst>
                                           <p:attrName>style.visibility</p:attrName>
@@ -10494,503 +10910,7 @@
                                       <p:cBhvr>
                                         <p:cTn dur="2000"/>
                                         <p:tgtEl>
-                                          <p:spTgt spid="137"/>
-                                        </p:tgtEl>
-                                      </p:cBhvr>
-                                    </p:animEffect>
-                                  </p:childTnLst>
-                                </p:cTn>
-                              </p:par>
-                            </p:childTnLst>
-                          </p:cTn>
-                        </p:par>
-                      </p:childTnLst>
-                    </p:cTn>
-                  </p:par>
-                </p:childTnLst>
-              </p:cTn>
-              <p:prevCondLst>
-                <p:cond evt="onPrev">
-                  <p:tgtEl>
-                    <p:sldTgt/>
-                  </p:tgtEl>
-                </p:cond>
-              </p:prevCondLst>
-              <p:nextCondLst>
-                <p:cond evt="onNext">
-                  <p:tgtEl>
-                    <p:sldTgt/>
-                  </p:tgtEl>
-                </p:cond>
-              </p:nextCondLst>
-            </p:seq>
-          </p:childTnLst>
-        </p:cTn>
-      </p:par>
-    </p:tnLst>
-  </p:timing>
-</p:sld>
-</file>
-
-<file path=ppt/slides/slide9.xml><?xml version="1.0" encoding="utf-8"?>
-<p:sld xmlns:a="http://schemas.openxmlformats.org/drawingml/2006/main" xmlns:r="http://schemas.openxmlformats.org/officeDocument/2006/relationships" xmlns:mc="http://schemas.openxmlformats.org/markup-compatibility/2006" xmlns:mv="urn:schemas-microsoft-com:mac:vml" xmlns:p="http://schemas.openxmlformats.org/presentationml/2006/main" xmlns:c="http://schemas.openxmlformats.org/drawingml/2006/chart" xmlns:dgm="http://schemas.openxmlformats.org/drawingml/2006/diagram" xmlns:o="urn:schemas-microsoft-com:office:office" xmlns:v="urn:schemas-microsoft-com:vml" xmlns:pvml="urn:schemas-microsoft-com:office:powerpoint" xmlns:com="http://schemas.openxmlformats.org/drawingml/2006/compatibility" xmlns:p14="http://schemas.microsoft.com/office/powerpoint/2010/main" xmlns:p15="http://schemas.microsoft.com/office/powerpoint/2012/main">
-  <p:cSld>
-    <p:spTree>
-      <p:nvGrpSpPr>
-        <p:cNvPr id="148" name="Shape 148"/>
-        <p:cNvGrpSpPr/>
-        <p:nvPr/>
-      </p:nvGrpSpPr>
-      <p:grpSpPr>
-        <a:xfrm>
-          <a:off x="0" y="0"/>
-          <a:ext cx="0" cy="0"/>
-          <a:chOff x="0" y="0"/>
-          <a:chExt cx="0" cy="0"/>
-        </a:xfrm>
-      </p:grpSpPr>
-      <p:pic>
-        <p:nvPicPr>
-          <p:cNvPr id="149" name="Google Shape;149;p21"/>
-          <p:cNvPicPr preferRelativeResize="0"/>
-          <p:nvPr/>
-        </p:nvPicPr>
-        <p:blipFill>
-          <a:blip r:embed="rId3">
-            <a:alphaModFix/>
-          </a:blip>
-          <a:stretch>
-            <a:fillRect/>
-          </a:stretch>
-        </p:blipFill>
-        <p:spPr>
-          <a:xfrm>
-            <a:off x="1780571" y="1440750"/>
-            <a:ext cx="5558230" cy="1436725"/>
-          </a:xfrm>
-          <a:prstGeom prst="rect">
-            <a:avLst/>
-          </a:prstGeom>
-          <a:noFill/>
-          <a:ln>
-            <a:noFill/>
-          </a:ln>
-          <a:effectLst>
-            <a:outerShdw blurRad="57150" rotWithShape="0" algn="bl" dir="5400000" dist="19050">
-              <a:srgbClr val="000000">
-                <a:alpha val="50000"/>
-              </a:srgbClr>
-            </a:outerShdw>
-          </a:effectLst>
-        </p:spPr>
-      </p:pic>
-      <p:pic>
-        <p:nvPicPr>
-          <p:cNvPr id="150" name="Google Shape;150;p21"/>
-          <p:cNvPicPr preferRelativeResize="0"/>
-          <p:nvPr/>
-        </p:nvPicPr>
-        <p:blipFill>
-          <a:blip r:embed="rId4">
-            <a:alphaModFix/>
-          </a:blip>
-          <a:stretch>
-            <a:fillRect/>
-          </a:stretch>
-        </p:blipFill>
-        <p:spPr>
-          <a:xfrm>
-            <a:off x="1780575" y="2918062"/>
-            <a:ext cx="5558226" cy="2148664"/>
-          </a:xfrm>
-          <a:prstGeom prst="rect">
-            <a:avLst/>
-          </a:prstGeom>
-          <a:noFill/>
-          <a:ln>
-            <a:noFill/>
-          </a:ln>
-          <a:effectLst>
-            <a:outerShdw blurRad="57150" rotWithShape="0" algn="bl" dir="5400000" dist="19050">
-              <a:srgbClr val="000000">
-                <a:alpha val="50000"/>
-              </a:srgbClr>
-            </a:outerShdw>
-          </a:effectLst>
-        </p:spPr>
-      </p:pic>
-      <p:pic>
-        <p:nvPicPr>
-          <p:cNvPr id="151" name="Google Shape;151;p21"/>
-          <p:cNvPicPr preferRelativeResize="0"/>
-          <p:nvPr/>
-        </p:nvPicPr>
-        <p:blipFill>
-          <a:blip r:embed="rId5">
-            <a:alphaModFix/>
-          </a:blip>
-          <a:stretch>
-            <a:fillRect/>
-          </a:stretch>
-        </p:blipFill>
-        <p:spPr>
-          <a:xfrm>
-            <a:off x="8325525" y="4593059"/>
-            <a:ext cx="752475" cy="495300"/>
-          </a:xfrm>
-          <a:prstGeom prst="rect">
-            <a:avLst/>
-          </a:prstGeom>
-          <a:noFill/>
-          <a:ln>
-            <a:noFill/>
-          </a:ln>
-        </p:spPr>
-      </p:pic>
-      <p:sp>
-        <p:nvSpPr>
-          <p:cNvPr id="152" name="Google Shape;152;p21"/>
-          <p:cNvSpPr/>
-          <p:nvPr/>
-        </p:nvSpPr>
-        <p:spPr>
-          <a:xfrm>
-            <a:off x="-179682" y="-308191"/>
-            <a:ext cx="9647400" cy="1688700"/>
-          </a:xfrm>
-          <a:prstGeom prst="rect">
-            <a:avLst/>
-          </a:prstGeom>
-          <a:solidFill>
-            <a:srgbClr val="002645"/>
-          </a:solidFill>
-          <a:ln>
-            <a:noFill/>
-          </a:ln>
-          <a:effectLst>
-            <a:outerShdw blurRad="50800" rotWithShape="0" dir="5400000" dist="38100">
-              <a:srgbClr val="000000">
-                <a:alpha val="40000"/>
-              </a:srgbClr>
-            </a:outerShdw>
-          </a:effectLst>
-        </p:spPr>
-        <p:txBody>
-          <a:bodyPr anchorCtr="0" anchor="ctr" bIns="34275" lIns="34275" spcFirstLastPara="1" rIns="34275" wrap="square" tIns="34275">
-            <a:noAutofit/>
-          </a:bodyPr>
-          <a:lstStyle/>
-          <a:p>
-            <a:pPr indent="0" lvl="0" marL="0" marR="0" rtl="0" algn="ctr">
-              <a:lnSpc>
-                <a:spcPct val="100000"/>
-              </a:lnSpc>
-              <a:spcBef>
-                <a:spcPts val="0"/>
-              </a:spcBef>
-              <a:spcAft>
-                <a:spcPts val="0"/>
-              </a:spcAft>
-              <a:buClr>
-                <a:srgbClr val="FFFFFF"/>
-              </a:buClr>
-              <a:buSzPts val="1400"/>
-              <a:buFont typeface="Calibri"/>
-              <a:buNone/>
-            </a:pPr>
-            <a:r>
-              <a:t/>
-            </a:r>
-            <a:endParaRPr b="0" i="0" sz="1400" u="none" cap="none" strike="noStrike">
-              <a:solidFill>
-                <a:srgbClr val="FFFFFF"/>
-              </a:solidFill>
-              <a:latin typeface="Calibri"/>
-              <a:ea typeface="Calibri"/>
-              <a:cs typeface="Calibri"/>
-              <a:sym typeface="Calibri"/>
-            </a:endParaRPr>
-          </a:p>
-        </p:txBody>
-      </p:sp>
-      <p:sp>
-        <p:nvSpPr>
-          <p:cNvPr id="153" name="Google Shape;153;p21"/>
-          <p:cNvSpPr/>
-          <p:nvPr/>
-        </p:nvSpPr>
-        <p:spPr>
-          <a:xfrm>
-            <a:off x="228601" y="331700"/>
-            <a:ext cx="8211600" cy="468600"/>
-          </a:xfrm>
-          <a:prstGeom prst="rect">
-            <a:avLst/>
-          </a:prstGeom>
-          <a:noFill/>
-          <a:ln>
-            <a:noFill/>
-          </a:ln>
-        </p:spPr>
-        <p:txBody>
-          <a:bodyPr anchorCtr="0" anchor="t" bIns="34275" lIns="34275" spcFirstLastPara="1" rIns="34275" wrap="square" tIns="34275">
-            <a:noAutofit/>
-          </a:bodyPr>
-          <a:lstStyle/>
-          <a:p>
-            <a:pPr indent="0" lvl="0" marL="0" marR="0" rtl="0" algn="l">
-              <a:lnSpc>
-                <a:spcPct val="100000"/>
-              </a:lnSpc>
-              <a:spcBef>
-                <a:spcPts val="0"/>
-              </a:spcBef>
-              <a:spcAft>
-                <a:spcPts val="0"/>
-              </a:spcAft>
-              <a:buClr>
-                <a:srgbClr val="F2F2F2"/>
-              </a:buClr>
-              <a:buSzPts val="2600"/>
-              <a:buFont typeface="Open Sans"/>
-              <a:buNone/>
-            </a:pPr>
-            <a:r>
-              <a:rPr b="1" lang="en" sz="2600">
-                <a:solidFill>
-                  <a:srgbClr val="F2F2F2"/>
-                </a:solidFill>
-                <a:latin typeface="Open Sans"/>
-                <a:ea typeface="Open Sans"/>
-                <a:cs typeface="Open Sans"/>
-                <a:sym typeface="Open Sans"/>
-              </a:rPr>
-              <a:t>Demo</a:t>
-            </a:r>
-            <a:endParaRPr sz="1100"/>
-          </a:p>
-        </p:txBody>
-      </p:sp>
-      <p:sp>
-        <p:nvSpPr>
-          <p:cNvPr id="154" name="Google Shape;154;p21"/>
-          <p:cNvSpPr/>
-          <p:nvPr/>
-        </p:nvSpPr>
-        <p:spPr>
-          <a:xfrm>
-            <a:off x="313771" y="843754"/>
-            <a:ext cx="2789700" cy="34200"/>
-          </a:xfrm>
-          <a:prstGeom prst="rect">
-            <a:avLst/>
-          </a:prstGeom>
-          <a:solidFill>
-            <a:srgbClr val="DE6E22"/>
-          </a:solidFill>
-          <a:ln>
-            <a:noFill/>
-          </a:ln>
-        </p:spPr>
-        <p:txBody>
-          <a:bodyPr anchorCtr="0" anchor="ctr" bIns="34275" lIns="34275" spcFirstLastPara="1" rIns="34275" wrap="square" tIns="34275">
-            <a:noAutofit/>
-          </a:bodyPr>
-          <a:lstStyle/>
-          <a:p>
-            <a:pPr indent="0" lvl="0" marL="0" marR="0" rtl="0" algn="ctr">
-              <a:lnSpc>
-                <a:spcPct val="100000"/>
-              </a:lnSpc>
-              <a:spcBef>
-                <a:spcPts val="0"/>
-              </a:spcBef>
-              <a:spcAft>
-                <a:spcPts val="0"/>
-              </a:spcAft>
-              <a:buClr>
-                <a:srgbClr val="FFFFFF"/>
-              </a:buClr>
-              <a:buSzPts val="1400"/>
-              <a:buFont typeface="Calibri"/>
-              <a:buNone/>
-            </a:pPr>
-            <a:r>
-              <a:t/>
-            </a:r>
-            <a:endParaRPr b="0" i="0" sz="1400" u="none" cap="none" strike="noStrike">
-              <a:solidFill>
-                <a:srgbClr val="FFFFFF"/>
-              </a:solidFill>
-              <a:latin typeface="Calibri"/>
-              <a:ea typeface="Calibri"/>
-              <a:cs typeface="Calibri"/>
-              <a:sym typeface="Calibri"/>
-            </a:endParaRPr>
-          </a:p>
-        </p:txBody>
-      </p:sp>
-      <p:sp>
-        <p:nvSpPr>
-          <p:cNvPr id="155" name="Google Shape;155;p21"/>
-          <p:cNvSpPr/>
-          <p:nvPr/>
-        </p:nvSpPr>
-        <p:spPr>
-          <a:xfrm>
-            <a:off x="228601" y="952975"/>
-            <a:ext cx="2419500" cy="335100"/>
-          </a:xfrm>
-          <a:prstGeom prst="rect">
-            <a:avLst/>
-          </a:prstGeom>
-          <a:noFill/>
-          <a:ln>
-            <a:noFill/>
-          </a:ln>
-        </p:spPr>
-        <p:txBody>
-          <a:bodyPr anchorCtr="0" anchor="t" bIns="34275" lIns="34275" spcFirstLastPara="1" rIns="34275" wrap="square" tIns="34275">
-            <a:noAutofit/>
-          </a:bodyPr>
-          <a:lstStyle/>
-          <a:p>
-            <a:pPr indent="0" lvl="0" marL="0" marR="0" rtl="0" algn="l">
-              <a:lnSpc>
-                <a:spcPct val="100000"/>
-              </a:lnSpc>
-              <a:spcBef>
-                <a:spcPts val="0"/>
-              </a:spcBef>
-              <a:spcAft>
-                <a:spcPts val="0"/>
-              </a:spcAft>
-              <a:buClr>
-                <a:srgbClr val="D9D9D9"/>
-              </a:buClr>
-              <a:buSzPts val="1700"/>
-              <a:buFont typeface="Open Sans"/>
-              <a:buNone/>
-            </a:pPr>
-            <a:r>
-              <a:t/>
-            </a:r>
-            <a:endParaRPr sz="1100"/>
-          </a:p>
-        </p:txBody>
-      </p:sp>
-      <p:sp>
-        <p:nvSpPr>
-          <p:cNvPr id="156" name="Google Shape;156;p21"/>
-          <p:cNvSpPr/>
-          <p:nvPr/>
-        </p:nvSpPr>
-        <p:spPr>
-          <a:xfrm>
-            <a:off x="228600" y="952975"/>
-            <a:ext cx="3090900" cy="335100"/>
-          </a:xfrm>
-          <a:prstGeom prst="rect">
-            <a:avLst/>
-          </a:prstGeom>
-          <a:noFill/>
-          <a:ln>
-            <a:noFill/>
-          </a:ln>
-        </p:spPr>
-        <p:txBody>
-          <a:bodyPr anchorCtr="0" anchor="t" bIns="34275" lIns="34275" spcFirstLastPara="1" rIns="34275" wrap="square" tIns="34275">
-            <a:noAutofit/>
-          </a:bodyPr>
-          <a:lstStyle/>
-          <a:p>
-            <a:pPr indent="0" lvl="0" marL="0" marR="0" rtl="0" algn="l">
-              <a:lnSpc>
-                <a:spcPct val="100000"/>
-              </a:lnSpc>
-              <a:spcBef>
-                <a:spcPts val="0"/>
-              </a:spcBef>
-              <a:spcAft>
-                <a:spcPts val="0"/>
-              </a:spcAft>
-              <a:buClr>
-                <a:srgbClr val="D9D9D9"/>
-              </a:buClr>
-              <a:buSzPts val="1700"/>
-              <a:buFont typeface="Open Sans"/>
-              <a:buNone/>
-            </a:pPr>
-            <a:r>
-              <a:rPr lang="en" sz="1700">
-                <a:solidFill>
-                  <a:srgbClr val="D9D9D9"/>
-                </a:solidFill>
-                <a:latin typeface="Open Sans"/>
-                <a:ea typeface="Open Sans"/>
-                <a:cs typeface="Open Sans"/>
-                <a:sym typeface="Open Sans"/>
-              </a:rPr>
-              <a:t>Python API and CLI</a:t>
-            </a:r>
-            <a:endParaRPr sz="1100"/>
-          </a:p>
-        </p:txBody>
-      </p:sp>
-    </p:spTree>
-  </p:cSld>
-  <p:clrMapOvr>
-    <a:masterClrMapping/>
-  </p:clrMapOvr>
-  <p:timing>
-    <p:tnLst>
-      <p:par>
-        <p:cTn dur="indefinite" nodeType="tmRoot" restart="never">
-          <p:childTnLst>
-            <p:seq concurrent="1" nextAc="seek">
-              <p:cTn dur="indefinite" id="2" nodeType="mainSeq">
-                <p:childTnLst>
-                  <p:par>
-                    <p:cTn fill="hold">
-                      <p:stCondLst>
-                        <p:cond delay="indefinite"/>
-                      </p:stCondLst>
-                      <p:childTnLst>
-                        <p:par>
-                          <p:cTn fill="hold">
-                            <p:stCondLst>
-                              <p:cond delay="0"/>
-                            </p:stCondLst>
-                            <p:childTnLst>
-                              <p:par>
-                                <p:cTn fill="hold" nodeType="clickEffect" presetClass="entr" presetID="10" presetSubtype="0">
-                                  <p:stCondLst>
-                                    <p:cond delay="0"/>
-                                  </p:stCondLst>
-                                  <p:childTnLst>
-                                    <p:set>
-                                      <p:cBhvr>
-                                        <p:cTn dur="1" fill="hold">
-                                          <p:stCondLst>
-                                            <p:cond delay="0"/>
-                                          </p:stCondLst>
-                                        </p:cTn>
-                                        <p:tgtEl>
-                                          <p:spTgt spid="149"/>
-                                        </p:tgtEl>
-                                        <p:attrNameLst>
-                                          <p:attrName>style.visibility</p:attrName>
-                                        </p:attrNameLst>
-                                      </p:cBhvr>
-                                      <p:to>
-                                        <p:strVal val="visible"/>
-                                      </p:to>
-                                    </p:set>
-                                    <p:animEffect filter="fade" transition="in">
-                                      <p:cBhvr>
-                                        <p:cTn dur="2600"/>
-                                        <p:tgtEl>
-                                          <p:spTgt spid="149"/>
+                                          <p:spTgt spid="144"/>
                                         </p:tgtEl>
                                       </p:cBhvr>
                                     </p:animEffect>
@@ -11029,7 +10949,7 @@
                                           </p:stCondLst>
                                         </p:cTn>
                                         <p:tgtEl>
-                                          <p:spTgt spid="150"/>
+                                          <p:spTgt spid="142"/>
                                         </p:tgtEl>
                                         <p:attrNameLst>
                                           <p:attrName>style.visibility</p:attrName>
@@ -11041,9 +10961,115 @@
                                     </p:set>
                                     <p:animEffect filter="fade" transition="in">
                                       <p:cBhvr>
-                                        <p:cTn dur="2600"/>
+                                        <p:cTn dur="2000"/>
                                         <p:tgtEl>
-                                          <p:spTgt spid="150"/>
+                                          <p:spTgt spid="142"/>
+                                        </p:tgtEl>
+                                      </p:cBhvr>
+                                    </p:animEffect>
+                                  </p:childTnLst>
+                                </p:cTn>
+                              </p:par>
+                            </p:childTnLst>
+                          </p:cTn>
+                        </p:par>
+                      </p:childTnLst>
+                    </p:cTn>
+                  </p:par>
+                  <p:par>
+                    <p:cTn fill="hold">
+                      <p:stCondLst>
+                        <p:cond delay="indefinite"/>
+                      </p:stCondLst>
+                      <p:childTnLst>
+                        <p:par>
+                          <p:cTn fill="hold">
+                            <p:stCondLst>
+                              <p:cond delay="0"/>
+                            </p:stCondLst>
+                            <p:childTnLst>
+                              <p:par>
+                                <p:cTn fill="hold" nodeType="clickEffect" presetClass="entr" presetID="10" presetSubtype="0">
+                                  <p:stCondLst>
+                                    <p:cond delay="0"/>
+                                  </p:stCondLst>
+                                  <p:childTnLst>
+                                    <p:set>
+                                      <p:cBhvr>
+                                        <p:cTn dur="1" fill="hold">
+                                          <p:stCondLst>
+                                            <p:cond delay="0"/>
+                                          </p:stCondLst>
+                                        </p:cTn>
+                                        <p:tgtEl>
+                                          <p:spTgt spid="141"/>
+                                        </p:tgtEl>
+                                        <p:attrNameLst>
+                                          <p:attrName>style.visibility</p:attrName>
+                                        </p:attrNameLst>
+                                      </p:cBhvr>
+                                      <p:to>
+                                        <p:strVal val="visible"/>
+                                      </p:to>
+                                    </p:set>
+                                    <p:animEffect filter="fade" transition="in">
+                                      <p:cBhvr>
+                                        <p:cTn dur="2000"/>
+                                        <p:tgtEl>
+                                          <p:spTgt spid="141"/>
+                                        </p:tgtEl>
+                                      </p:cBhvr>
+                                    </p:animEffect>
+                                  </p:childTnLst>
+                                </p:cTn>
+                              </p:par>
+                            </p:childTnLst>
+                          </p:cTn>
+                        </p:par>
+                      </p:childTnLst>
+                    </p:cTn>
+                  </p:par>
+                  <p:par>
+                    <p:cTn fill="hold">
+                      <p:stCondLst>
+                        <p:cond delay="indefinite"/>
+                      </p:stCondLst>
+                      <p:childTnLst>
+                        <p:par>
+                          <p:cTn fill="hold">
+                            <p:stCondLst>
+                              <p:cond delay="0"/>
+                            </p:stCondLst>
+                            <p:childTnLst>
+                              <p:par>
+                                <p:cTn fill="hold" nodeType="clickEffect" presetClass="entr" presetID="10" presetSubtype="0">
+                                  <p:stCondLst>
+                                    <p:cond delay="0"/>
+                                  </p:stCondLst>
+                                  <p:childTnLst>
+                                    <p:set>
+                                      <p:cBhvr>
+                                        <p:cTn dur="1" fill="hold">
+                                          <p:stCondLst>
+                                            <p:cond delay="0"/>
+                                          </p:stCondLst>
+                                        </p:cTn>
+                                        <p:tgtEl>
+                                          <p:spTgt spid="143"/>
+                                        </p:tgtEl>
+                                        <p:attrNameLst>
+                                          <p:attrName>style.visibility</p:attrName>
+                                        </p:attrNameLst>
+                                      </p:cBhvr>
+                                      <p:to>
+                                        <p:strVal val="visible"/>
+                                      </p:to>
+                                    </p:set>
+                                    <p:animEffect filter="fade" transition="in">
+                                      <p:cBhvr>
+                                        <p:cTn dur="2000"/>
+                                        <p:tgtEl>
+                                          <p:spTgt spid="143"/>
                                         </p:tgtEl>
                                       </p:cBhvr>
                                     </p:animEffect>
@@ -11082,6 +11108,285 @@
 </file>
 
 <file path=ppt/theme/theme1.xml><?xml version="1.0" encoding="utf-8"?>
+<a:theme xmlns:a="http://schemas.openxmlformats.org/drawingml/2006/main" xmlns:r="http://schemas.openxmlformats.org/officeDocument/2006/relationships" name="Simple Light">
+  <a:themeElements>
+    <a:clrScheme name="Simple Light">
+      <a:dk1>
+        <a:srgbClr val="000000"/>
+      </a:dk1>
+      <a:lt1>
+        <a:srgbClr val="FFFFFF"/>
+      </a:lt1>
+      <a:dk2>
+        <a:srgbClr val="595959"/>
+      </a:dk2>
+      <a:lt2>
+        <a:srgbClr val="EEEEEE"/>
+      </a:lt2>
+      <a:accent1>
+        <a:srgbClr val="FFAB40"/>
+      </a:accent1>
+      <a:accent2>
+        <a:srgbClr val="212121"/>
+      </a:accent2>
+      <a:accent3>
+        <a:srgbClr val="78909C"/>
+      </a:accent3>
+      <a:accent4>
+        <a:srgbClr val="FFAB40"/>
+      </a:accent4>
+      <a:accent5>
+        <a:srgbClr val="0097A7"/>
+      </a:accent5>
+      <a:accent6>
+        <a:srgbClr val="EEFF41"/>
+      </a:accent6>
+      <a:hlink>
+        <a:srgbClr val="0097A7"/>
+      </a:hlink>
+      <a:folHlink>
+        <a:srgbClr val="0097A7"/>
+      </a:folHlink>
+    </a:clrScheme>
+    <a:fontScheme name="Office">
+      <a:majorFont>
+        <a:latin typeface="Arial"/>
+        <a:ea typeface=""/>
+        <a:cs typeface=""/>
+        <a:font script="Jpan" typeface="ＭＳ Ｐゴシック"/>
+        <a:font script="Hang" typeface="맑은 고딕"/>
+        <a:font script="Hans" typeface="宋体"/>
+        <a:font script="Hant" typeface="新細明體"/>
+        <a:font script="Arab" typeface="Times New Roman"/>
+        <a:font script="Hebr" typeface="Times New Roman"/>
+        <a:font script="Thai" typeface="Angsana New"/>
+        <a:font script="Ethi" typeface="Nyala"/>
+        <a:font script="Beng" typeface="Vrinda"/>
+        <a:font script="Gujr" typeface="Shruti"/>
+        <a:font script="Khmr" typeface="MoolBoran"/>
+        <a:font script="Knda" typeface="Tunga"/>
+        <a:font script="Guru" typeface="Raavi"/>
+        <a:font script="Cans" typeface="Euphemia"/>
+        <a:font script="Cher" typeface="Plantagenet Cherokee"/>
+        <a:font script="Yiii" typeface="Microsoft Yi Baiti"/>
+        <a:font script="Tibt" typeface="Microsoft Himalaya"/>
+        <a:font script="Thaa" typeface="MV Boli"/>
+        <a:font script="Deva" typeface="Mangal"/>
+        <a:font script="Telu" typeface="Gautami"/>
+        <a:font script="Taml" typeface="Latha"/>
+        <a:font script="Syrc" typeface="Estrangelo Edessa"/>
+        <a:font script="Orya" typeface="Kalinga"/>
+        <a:font script="Mlym" typeface="Kartika"/>
+        <a:font script="Laoo" typeface="DokChampa"/>
+        <a:font script="Sinh" typeface="Iskoola Pota"/>
+        <a:font script="Mong" typeface="Mongolian Baiti"/>
+        <a:font script="Viet" typeface="Times New Roman"/>
+        <a:font script="Uigh" typeface="Microsoft Uighur"/>
+        <a:font script="Geor" typeface="Sylfaen"/>
+      </a:majorFont>
+      <a:minorFont>
+        <a:latin typeface="Arial"/>
+        <a:ea typeface=""/>
+        <a:cs typeface=""/>
+        <a:font script="Jpan" typeface="ＭＳ Ｐゴシック"/>
+        <a:font script="Hang" typeface="맑은 고딕"/>
+        <a:font script="Hans" typeface="宋体"/>
+        <a:font script="Hant" typeface="新細明體"/>
+        <a:font script="Arab" typeface="Arial"/>
+        <a:font script="Hebr" typeface="Arial"/>
+        <a:font script="Thai" typeface="Cordia New"/>
+        <a:font script="Ethi" typeface="Nyala"/>
+        <a:font script="Beng" typeface="Vrinda"/>
+        <a:font script="Gujr" typeface="Shruti"/>
+        <a:font script="Khmr" typeface="DaunPenh"/>
+        <a:font script="Knda" typeface="Tunga"/>
+        <a:font script="Guru" typeface="Raavi"/>
+        <a:font script="Cans" typeface="Euphemia"/>
+        <a:font script="Cher" typeface="Plantagenet Cherokee"/>
+        <a:font script="Yiii" typeface="Microsoft Yi Baiti"/>
+        <a:font script="Tibt" typeface="Microsoft Himalaya"/>
+        <a:font script="Thaa" typeface="MV Boli"/>
+        <a:font script="Deva" typeface="Mangal"/>
+        <a:font script="Telu" typeface="Gautami"/>
+        <a:font script="Taml" typeface="Latha"/>
+        <a:font script="Syrc" typeface="Estrangelo Edessa"/>
+        <a:font script="Orya" typeface="Kalinga"/>
+        <a:font script="Mlym" typeface="Kartika"/>
+        <a:font script="Laoo" typeface="DokChampa"/>
+        <a:font script="Sinh" typeface="Iskoola Pota"/>
+        <a:font script="Mong" typeface="Mongolian Baiti"/>
+        <a:font script="Viet" typeface="Arial"/>
+        <a:font script="Uigh" typeface="Microsoft Uighur"/>
+        <a:font script="Geor" typeface="Sylfaen"/>
+      </a:minorFont>
+    </a:fontScheme>
+    <a:fmtScheme name="Office">
+      <a:fillStyleLst>
+        <a:solidFill>
+          <a:schemeClr val="phClr"/>
+        </a:solidFill>
+        <a:gradFill rotWithShape="1">
+          <a:gsLst>
+            <a:gs pos="0">
+              <a:schemeClr val="phClr">
+                <a:tint val="50000"/>
+                <a:satMod val="300000"/>
+              </a:schemeClr>
+            </a:gs>
+            <a:gs pos="35000">
+              <a:schemeClr val="phClr">
+                <a:tint val="37000"/>
+                <a:satMod val="300000"/>
+              </a:schemeClr>
+            </a:gs>
+            <a:gs pos="100000">
+              <a:schemeClr val="phClr">
+                <a:tint val="15000"/>
+                <a:satMod val="350000"/>
+              </a:schemeClr>
+            </a:gs>
+          </a:gsLst>
+          <a:lin ang="16200000" scaled="1"/>
+        </a:gradFill>
+        <a:gradFill rotWithShape="1">
+          <a:gsLst>
+            <a:gs pos="0">
+              <a:schemeClr val="phClr">
+                <a:tint val="100000"/>
+                <a:shade val="100000"/>
+                <a:satMod val="130000"/>
+              </a:schemeClr>
+            </a:gs>
+            <a:gs pos="100000">
+              <a:schemeClr val="phClr">
+                <a:tint val="50000"/>
+                <a:shade val="100000"/>
+                <a:satMod val="350000"/>
+              </a:schemeClr>
+            </a:gs>
+          </a:gsLst>
+          <a:lin ang="16200000" scaled="0"/>
+        </a:gradFill>
+      </a:fillStyleLst>
+      <a:lnStyleLst>
+        <a:ln w="9525" cap="flat" cmpd="sng" algn="ctr">
+          <a:solidFill>
+            <a:schemeClr val="phClr">
+              <a:shade val="95000"/>
+              <a:satMod val="105000"/>
+            </a:schemeClr>
+          </a:solidFill>
+          <a:prstDash val="solid"/>
+        </a:ln>
+        <a:ln w="25400" cap="flat" cmpd="sng" algn="ctr">
+          <a:solidFill>
+            <a:schemeClr val="phClr"/>
+          </a:solidFill>
+          <a:prstDash val="solid"/>
+        </a:ln>
+        <a:ln w="38100" cap="flat" cmpd="sng" algn="ctr">
+          <a:solidFill>
+            <a:schemeClr val="phClr"/>
+          </a:solidFill>
+          <a:prstDash val="solid"/>
+        </a:ln>
+      </a:lnStyleLst>
+      <a:effectStyleLst>
+        <a:effectStyle>
+          <a:effectLst>
+            <a:outerShdw blurRad="40000" dist="20000" dir="5400000" rotWithShape="0">
+              <a:srgbClr val="000000">
+                <a:alpha val="38000"/>
+              </a:srgbClr>
+            </a:outerShdw>
+          </a:effectLst>
+        </a:effectStyle>
+        <a:effectStyle>
+          <a:effectLst>
+            <a:outerShdw blurRad="40000" dist="23000" dir="5400000" rotWithShape="0">
+              <a:srgbClr val="000000">
+                <a:alpha val="35000"/>
+              </a:srgbClr>
+            </a:outerShdw>
+          </a:effectLst>
+        </a:effectStyle>
+        <a:effectStyle>
+          <a:effectLst>
+            <a:outerShdw blurRad="40000" dist="23000" dir="5400000" rotWithShape="0">
+              <a:srgbClr val="000000">
+                <a:alpha val="35000"/>
+              </a:srgbClr>
+            </a:outerShdw>
+          </a:effectLst>
+          <a:scene3d>
+            <a:camera prst="orthographicFront">
+              <a:rot lat="0" lon="0" rev="0"/>
+            </a:camera>
+            <a:lightRig rig="threePt" dir="t">
+              <a:rot lat="0" lon="0" rev="1200000"/>
+            </a:lightRig>
+          </a:scene3d>
+          <a:sp3d>
+            <a:bevelT w="63500" h="25400"/>
+          </a:sp3d>
+        </a:effectStyle>
+      </a:effectStyleLst>
+      <a:bgFillStyleLst>
+        <a:solidFill>
+          <a:schemeClr val="phClr"/>
+        </a:solidFill>
+        <a:gradFill rotWithShape="1">
+          <a:gsLst>
+            <a:gs pos="0">
+              <a:schemeClr val="phClr">
+                <a:tint val="40000"/>
+                <a:satMod val="350000"/>
+              </a:schemeClr>
+            </a:gs>
+            <a:gs pos="40000">
+              <a:schemeClr val="phClr">
+                <a:tint val="45000"/>
+                <a:shade val="99000"/>
+                <a:satMod val="350000"/>
+              </a:schemeClr>
+            </a:gs>
+            <a:gs pos="100000">
+              <a:schemeClr val="phClr">
+                <a:shade val="20000"/>
+                <a:satMod val="255000"/>
+              </a:schemeClr>
+            </a:gs>
+          </a:gsLst>
+          <a:path path="circle">
+            <a:fillToRect l="50000" t="-80000" r="50000" b="180000"/>
+          </a:path>
+        </a:gradFill>
+        <a:gradFill rotWithShape="1">
+          <a:gsLst>
+            <a:gs pos="0">
+              <a:schemeClr val="phClr">
+                <a:tint val="80000"/>
+                <a:satMod val="300000"/>
+              </a:schemeClr>
+            </a:gs>
+            <a:gs pos="100000">
+              <a:schemeClr val="phClr">
+                <a:shade val="30000"/>
+                <a:satMod val="200000"/>
+              </a:schemeClr>
+            </a:gs>
+          </a:gsLst>
+          <a:path path="circle">
+            <a:fillToRect l="50000" t="50000" r="50000" b="50000"/>
+          </a:path>
+        </a:gradFill>
+      </a:bgFillStyleLst>
+    </a:fmtScheme>
+  </a:themeElements>
+</a:theme>
+</file>
+
+<file path=ppt/theme/theme2.xml><?xml version="1.0" encoding="utf-8"?>
 <a:theme xmlns:a="http://schemas.openxmlformats.org/drawingml/2006/main" xmlns:r="http://schemas.openxmlformats.org/officeDocument/2006/relationships">
   <a:themeElements>
     <a:clrScheme name="Default">
@@ -11358,283 +11663,4 @@
     </a:fmtScheme>
   </a:themeElements>
 </a:theme>
-</file>
-
-<file path=ppt/theme/theme2.xml><?xml version="1.0" encoding="utf-8"?>
-<a:theme xmlns:a="http://schemas.openxmlformats.org/drawingml/2006/main" xmlns:r="http://schemas.openxmlformats.org/officeDocument/2006/relationships" name="Simple Light">
-  <a:themeElements>
-    <a:clrScheme name="Simple Light">
-      <a:dk1>
-        <a:srgbClr val="000000"/>
-      </a:dk1>
-      <a:lt1>
-        <a:srgbClr val="FFFFFF"/>
-      </a:lt1>
-      <a:dk2>
-        <a:srgbClr val="595959"/>
-      </a:dk2>
-      <a:lt2>
-        <a:srgbClr val="EEEEEE"/>
-      </a:lt2>
-      <a:accent1>
-        <a:srgbClr val="FFAB40"/>
-      </a:accent1>
-      <a:accent2>
-        <a:srgbClr val="212121"/>
-      </a:accent2>
-      <a:accent3>
-        <a:srgbClr val="78909C"/>
-      </a:accent3>
-      <a:accent4>
-        <a:srgbClr val="FFAB40"/>
-      </a:accent4>
-      <a:accent5>
-        <a:srgbClr val="0097A7"/>
-      </a:accent5>
-      <a:accent6>
-        <a:srgbClr val="EEFF41"/>
-      </a:accent6>
-      <a:hlink>
-        <a:srgbClr val="0097A7"/>
-      </a:hlink>
-      <a:folHlink>
-        <a:srgbClr val="0097A7"/>
-      </a:folHlink>
-    </a:clrScheme>
-    <a:fontScheme name="Office">
-      <a:majorFont>
-        <a:latin typeface="Arial"/>
-        <a:ea typeface=""/>
-        <a:cs typeface=""/>
-        <a:font script="Jpan" typeface="ＭＳ Ｐゴシック"/>
-        <a:font script="Hang" typeface="맑은 고딕"/>
-        <a:font script="Hans" typeface="宋体"/>
-        <a:font script="Hant" typeface="新細明體"/>
-        <a:font script="Arab" typeface="Times New Roman"/>
-        <a:font script="Hebr" typeface="Times New Roman"/>
-        <a:font script="Thai" typeface="Angsana New"/>
-        <a:font script="Ethi" typeface="Nyala"/>
-        <a:font script="Beng" typeface="Vrinda"/>
-        <a:font script="Gujr" typeface="Shruti"/>
-        <a:font script="Khmr" typeface="MoolBoran"/>
-        <a:font script="Knda" typeface="Tunga"/>
-        <a:font script="Guru" typeface="Raavi"/>
-        <a:font script="Cans" typeface="Euphemia"/>
-        <a:font script="Cher" typeface="Plantagenet Cherokee"/>
-        <a:font script="Yiii" typeface="Microsoft Yi Baiti"/>
-        <a:font script="Tibt" typeface="Microsoft Himalaya"/>
-        <a:font script="Thaa" typeface="MV Boli"/>
-        <a:font script="Deva" typeface="Mangal"/>
-        <a:font script="Telu" typeface="Gautami"/>
-        <a:font script="Taml" typeface="Latha"/>
-        <a:font script="Syrc" typeface="Estrangelo Edessa"/>
-        <a:font script="Orya" typeface="Kalinga"/>
-        <a:font script="Mlym" typeface="Kartika"/>
-        <a:font script="Laoo" typeface="DokChampa"/>
-        <a:font script="Sinh" typeface="Iskoola Pota"/>
-        <a:font script="Mong" typeface="Mongolian Baiti"/>
-        <a:font script="Viet" typeface="Times New Roman"/>
-        <a:font script="Uigh" typeface="Microsoft Uighur"/>
-        <a:font script="Geor" typeface="Sylfaen"/>
-      </a:majorFont>
-      <a:minorFont>
-        <a:latin typeface="Arial"/>
-        <a:ea typeface=""/>
-        <a:cs typeface=""/>
-        <a:font script="Jpan" typeface="ＭＳ Ｐゴシック"/>
-        <a:font script="Hang" typeface="맑은 고딕"/>
-        <a:font script="Hans" typeface="宋体"/>
-        <a:font script="Hant" typeface="新細明體"/>
-        <a:font script="Arab" typeface="Arial"/>
-        <a:font script="Hebr" typeface="Arial"/>
-        <a:font script="Thai" typeface="Cordia New"/>
-        <a:font script="Ethi" typeface="Nyala"/>
-        <a:font script="Beng" typeface="Vrinda"/>
-        <a:font script="Gujr" typeface="Shruti"/>
-        <a:font script="Khmr" typeface="DaunPenh"/>
-        <a:font script="Knda" typeface="Tunga"/>
-        <a:font script="Guru" typeface="Raavi"/>
-        <a:font script="Cans" typeface="Euphemia"/>
-        <a:font script="Cher" typeface="Plantagenet Cherokee"/>
-        <a:font script="Yiii" typeface="Microsoft Yi Baiti"/>
-        <a:font script="Tibt" typeface="Microsoft Himalaya"/>
-        <a:font script="Thaa" typeface="MV Boli"/>
-        <a:font script="Deva" typeface="Mangal"/>
-        <a:font script="Telu" typeface="Gautami"/>
-        <a:font script="Taml" typeface="Latha"/>
-        <a:font script="Syrc" typeface="Estrangelo Edessa"/>
-        <a:font script="Orya" typeface="Kalinga"/>
-        <a:font script="Mlym" typeface="Kartika"/>
-        <a:font script="Laoo" typeface="DokChampa"/>
-        <a:font script="Sinh" typeface="Iskoola Pota"/>
-        <a:font script="Mong" typeface="Mongolian Baiti"/>
-        <a:font script="Viet" typeface="Arial"/>
-        <a:font script="Uigh" typeface="Microsoft Uighur"/>
-        <a:font script="Geor" typeface="Sylfaen"/>
-      </a:minorFont>
-    </a:fontScheme>
-    <a:fmtScheme name="Office">
-      <a:fillStyleLst>
-        <a:solidFill>
-          <a:schemeClr val="phClr"/>
-        </a:solidFill>
-        <a:gradFill rotWithShape="1">
-          <a:gsLst>
-            <a:gs pos="0">
-              <a:schemeClr val="phClr">
-                <a:tint val="50000"/>
-                <a:satMod val="300000"/>
-              </a:schemeClr>
-            </a:gs>
-            <a:gs pos="35000">
-              <a:schemeClr val="phClr">
-                <a:tint val="37000"/>
-                <a:satMod val="300000"/>
-              </a:schemeClr>
-            </a:gs>
-            <a:gs pos="100000">
-              <a:schemeClr val="phClr">
-                <a:tint val="15000"/>
-                <a:satMod val="350000"/>
-              </a:schemeClr>
-            </a:gs>
-          </a:gsLst>
-          <a:lin ang="16200000" scaled="1"/>
-        </a:gradFill>
-        <a:gradFill rotWithShape="1">
-          <a:gsLst>
-            <a:gs pos="0">
-              <a:schemeClr val="phClr">
-                <a:tint val="100000"/>
-                <a:shade val="100000"/>
-                <a:satMod val="130000"/>
-              </a:schemeClr>
-            </a:gs>
-            <a:gs pos="100000">
-              <a:schemeClr val="phClr">
-                <a:tint val="50000"/>
-                <a:shade val="100000"/>
-                <a:satMod val="350000"/>
-              </a:schemeClr>
-            </a:gs>
-          </a:gsLst>
-          <a:lin ang="16200000" scaled="0"/>
-        </a:gradFill>
-      </a:fillStyleLst>
-      <a:lnStyleLst>
-        <a:ln w="9525" cap="flat" cmpd="sng" algn="ctr">
-          <a:solidFill>
-            <a:schemeClr val="phClr">
-              <a:shade val="95000"/>
-              <a:satMod val="105000"/>
-            </a:schemeClr>
-          </a:solidFill>
-          <a:prstDash val="solid"/>
-        </a:ln>
-        <a:ln w="25400" cap="flat" cmpd="sng" algn="ctr">
-          <a:solidFill>
-            <a:schemeClr val="phClr"/>
-          </a:solidFill>
-          <a:prstDash val="solid"/>
-        </a:ln>
-        <a:ln w="38100" cap="flat" cmpd="sng" algn="ctr">
-          <a:solidFill>
-            <a:schemeClr val="phClr"/>
-          </a:solidFill>
-          <a:prstDash val="solid"/>
-        </a:ln>
-      </a:lnStyleLst>
-      <a:effectStyleLst>
-        <a:effectStyle>
-          <a:effectLst>
-            <a:outerShdw blurRad="40000" dist="20000" dir="5400000" rotWithShape="0">
-              <a:srgbClr val="000000">
-                <a:alpha val="38000"/>
-              </a:srgbClr>
-            </a:outerShdw>
-          </a:effectLst>
-        </a:effectStyle>
-        <a:effectStyle>
-          <a:effectLst>
-            <a:outerShdw blurRad="40000" dist="23000" dir="5400000" rotWithShape="0">
-              <a:srgbClr val="000000">
-                <a:alpha val="35000"/>
-              </a:srgbClr>
-            </a:outerShdw>
-          </a:effectLst>
-        </a:effectStyle>
-        <a:effectStyle>
-          <a:effectLst>
-            <a:outerShdw blurRad="40000" dist="23000" dir="5400000" rotWithShape="0">
-              <a:srgbClr val="000000">
-                <a:alpha val="35000"/>
-              </a:srgbClr>
-            </a:outerShdw>
-          </a:effectLst>
-          <a:scene3d>
-            <a:camera prst="orthographicFront">
-              <a:rot lat="0" lon="0" rev="0"/>
-            </a:camera>
-            <a:lightRig rig="threePt" dir="t">
-              <a:rot lat="0" lon="0" rev="1200000"/>
-            </a:lightRig>
-          </a:scene3d>
-          <a:sp3d>
-            <a:bevelT w="63500" h="25400"/>
-          </a:sp3d>
-        </a:effectStyle>
-      </a:effectStyleLst>
-      <a:bgFillStyleLst>
-        <a:solidFill>
-          <a:schemeClr val="phClr"/>
-        </a:solidFill>
-        <a:gradFill rotWithShape="1">
-          <a:gsLst>
-            <a:gs pos="0">
-              <a:schemeClr val="phClr">
-                <a:tint val="40000"/>
-                <a:satMod val="350000"/>
-              </a:schemeClr>
-            </a:gs>
-            <a:gs pos="40000">
-              <a:schemeClr val="phClr">
-                <a:tint val="45000"/>
-                <a:shade val="99000"/>
-                <a:satMod val="350000"/>
-              </a:schemeClr>
-            </a:gs>
-            <a:gs pos="100000">
-              <a:schemeClr val="phClr">
-                <a:shade val="20000"/>
-                <a:satMod val="255000"/>
-              </a:schemeClr>
-            </a:gs>
-          </a:gsLst>
-          <a:path path="circle">
-            <a:fillToRect l="50000" t="-80000" r="50000" b="180000"/>
-          </a:path>
-        </a:gradFill>
-        <a:gradFill rotWithShape="1">
-          <a:gsLst>
-            <a:gs pos="0">
-              <a:schemeClr val="phClr">
-                <a:tint val="80000"/>
-                <a:satMod val="300000"/>
-              </a:schemeClr>
-            </a:gs>
-            <a:gs pos="100000">
-              <a:schemeClr val="phClr">
-                <a:shade val="30000"/>
-                <a:satMod val="200000"/>
-              </a:schemeClr>
-            </a:gs>
-          </a:gsLst>
-          <a:path path="circle">
-            <a:fillToRect l="50000" t="50000" r="50000" b="50000"/>
-          </a:path>
-        </a:gradFill>
-      </a:bgFillStyleLst>
-    </a:fmtScheme>
-  </a:themeElements>
-</a:theme>
 </file>
</xml_diff>